<commit_message>
Added slide for further reading
</commit_message>
<xml_diff>
--- a/Presentation.pptx
+++ b/Presentation.pptx
@@ -7,10 +7,10 @@
     <p:sldMasterId id="2147483802" r:id="rId3"/>
   </p:sldMasterIdLst>
   <p:notesMasterIdLst>
-    <p:notesMasterId r:id="rId37"/>
+    <p:notesMasterId r:id="rId38"/>
   </p:notesMasterIdLst>
   <p:handoutMasterIdLst>
-    <p:handoutMasterId r:id="rId38"/>
+    <p:handoutMasterId r:id="rId39"/>
   </p:handoutMasterIdLst>
   <p:sldIdLst>
     <p:sldId id="256" r:id="rId4"/>
@@ -46,28 +46,29 @@
     <p:sldId id="261" r:id="rId34"/>
     <p:sldId id="346" r:id="rId35"/>
     <p:sldId id="281" r:id="rId36"/>
+    <p:sldId id="361" r:id="rId37"/>
   </p:sldIdLst>
   <p:sldSz cx="12188825" cy="6858000"/>
   <p:notesSz cx="6858000" cy="9144000"/>
   <p:embeddedFontLst>
     <p:embeddedFont>
       <p:font typeface="Segoe UI" panose="020B0502040204020203" pitchFamily="34" charset="0"/>
-      <p:regular r:id="rId39"/>
-      <p:bold r:id="rId40"/>
-      <p:italic r:id="rId41"/>
-      <p:boldItalic r:id="rId42"/>
+      <p:regular r:id="rId40"/>
+      <p:bold r:id="rId41"/>
+      <p:italic r:id="rId42"/>
+      <p:boldItalic r:id="rId43"/>
     </p:embeddedFont>
     <p:embeddedFont>
       <p:font typeface="Segoe UI Light" panose="020B0502040204020203" pitchFamily="34" charset="0"/>
-      <p:regular r:id="rId43"/>
-      <p:italic r:id="rId44"/>
+      <p:regular r:id="rId44"/>
+      <p:italic r:id="rId45"/>
     </p:embeddedFont>
     <p:embeddedFont>
       <p:font typeface="Consolas" panose="020B0609020204030204" pitchFamily="49" charset="0"/>
-      <p:regular r:id="rId45"/>
-      <p:bold r:id="rId46"/>
-      <p:italic r:id="rId47"/>
-      <p:boldItalic r:id="rId48"/>
+      <p:regular r:id="rId46"/>
+      <p:bold r:id="rId47"/>
+      <p:italic r:id="rId48"/>
+      <p:boldItalic r:id="rId49"/>
     </p:embeddedFont>
   </p:embeddedFontLst>
   <p:defaultTextStyle>
@@ -362,7 +363,7 @@
                 <a:latin typeface="Segoe UI" pitchFamily="34" charset="0"/>
               </a:rPr>
               <a:pPr/>
-              <a:t>5/4/2013</a:t>
+              <a:t>5/6/2013</a:t>
             </a:fld>
             <a:endParaRPr lang="en-US" dirty="0">
               <a:latin typeface="Segoe UI" pitchFamily="34" charset="0"/>
@@ -578,7 +579,7 @@
             <a:fld id="{7C3FBCD4-166E-446F-AF18-7D4A0CF9AEF6}" type="datetimeFigureOut">
               <a:rPr lang="en-US" smtClean="0"/>
               <a:pPr/>
-              <a:t>5/4/2013</a:t>
+              <a:t>5/6/2013</a:t>
             </a:fld>
             <a:endParaRPr lang="en-US" dirty="0"/>
           </a:p>
@@ -1963,42 +1964,14 @@
                 <a:effectLst/>
                 <a:latin typeface="Segoe UI" panose="020B0502040204020203" pitchFamily="34" charset="0"/>
               </a:rPr>
-              <a:t>hile Windows Azure SQL </a:t>
-            </a:r>
-            <a:r>
-              <a:rPr lang="en-US" baseline="0" dirty="0" smtClean="0">
-                <a:effectLst/>
-                <a:latin typeface="Segoe UI" panose="020B0502040204020203" pitchFamily="34" charset="0"/>
-              </a:rPr>
-              <a:t>Database is </a:t>
-            </a:r>
-            <a:r>
-              <a:rPr lang="en-US" baseline="0" dirty="0" smtClean="0">
-                <a:effectLst/>
-                <a:latin typeface="Segoe UI" panose="020B0502040204020203" pitchFamily="34" charset="0"/>
-              </a:rPr>
-              <a:t>MSSQL, </a:t>
-            </a:r>
-            <a:r>
-              <a:rPr lang="en-US" baseline="0" dirty="0" smtClean="0">
-                <a:effectLst/>
-                <a:latin typeface="Segoe UI" panose="020B0502040204020203" pitchFamily="34" charset="0"/>
-              </a:rPr>
-              <a:t>we do not interact with them in the same physical manner. </a:t>
+              <a:t>hile Windows Azure SQL Database is MSSQL, we do not interact with them in the same physical manner. </a:t>
             </a:r>
             <a:r>
               <a:rPr lang="en-US" dirty="0" smtClean="0">
                 <a:effectLst/>
                 <a:latin typeface="Segoe UI" panose="020B0502040204020203" pitchFamily="34" charset="0"/>
               </a:rPr>
-              <a:t>In </a:t>
-            </a:r>
-            <a:r>
-              <a:rPr lang="en-US" dirty="0" smtClean="0">
-                <a:effectLst/>
-                <a:latin typeface="Segoe UI" panose="020B0502040204020203" pitchFamily="34" charset="0"/>
-              </a:rPr>
-              <a:t>an on-premises</a:t>
+              <a:t>In an on-premises</a:t>
             </a:r>
             <a:r>
               <a:rPr lang="en-US" baseline="0" dirty="0" smtClean="0">
@@ -2040,21 +2013,7 @@
                 <a:effectLst/>
                 <a:latin typeface="Segoe UI" panose="020B0502040204020203" pitchFamily="34" charset="0"/>
               </a:rPr>
-              <a:t> </a:t>
-            </a:r>
-            <a:r>
-              <a:rPr lang="en-US" baseline="0" dirty="0" smtClean="0">
-                <a:effectLst/>
-                <a:latin typeface="Segoe UI" panose="020B0502040204020203" pitchFamily="34" charset="0"/>
-              </a:rPr>
-              <a:t>Windows Azure, we do not have physical access to the actual server</a:t>
-            </a:r>
-            <a:r>
-              <a:rPr lang="en-US" baseline="0" dirty="0" smtClean="0">
-                <a:effectLst/>
-                <a:latin typeface="Segoe UI" panose="020B0502040204020203" pitchFamily="34" charset="0"/>
-              </a:rPr>
-              <a:t>.</a:t>
+              <a:t> Windows Azure, we do not have physical access to the actual server.</a:t>
             </a:r>
           </a:p>
           <a:p>
@@ -2183,7 +2142,7 @@
         <p:spPr/>
         <p:txBody>
           <a:bodyPr>
-            <a:normAutofit fontScale="92500" lnSpcReduction="20000"/>
+            <a:normAutofit/>
           </a:bodyPr>
           <a:lstStyle/>
           <a:p>
@@ -7833,7 +7792,7 @@
             <a:fld id="{D7CE58A2-1EDC-45F0-BACE-E3574D82C834}" type="datetimeFigureOut">
               <a:rPr lang="en-US" smtClean="0"/>
               <a:pPr/>
-              <a:t>5/4/2013</a:t>
+              <a:t>5/6/2013</a:t>
             </a:fld>
             <a:endParaRPr lang="en-US"/>
           </a:p>
@@ -21381,15 +21340,7 @@
           <a:p>
             <a:r>
               <a:rPr lang="en-US" dirty="0" smtClean="0"/>
-              <a:t>Windows </a:t>
-            </a:r>
-            <a:r>
-              <a:rPr lang="en-US" dirty="0" smtClean="0"/>
-              <a:t>Azure SQL </a:t>
-            </a:r>
-            <a:r>
-              <a:rPr lang="en-US" dirty="0" smtClean="0"/>
-              <a:t>Databases</a:t>
+              <a:t>Windows Azure SQL Databases</a:t>
             </a:r>
             <a:endParaRPr lang="en-US" dirty="0"/>
           </a:p>
@@ -21428,11 +21379,7 @@
             </a:r>
             <a:r>
               <a:rPr lang="en-US" sz="2000" dirty="0" err="1" smtClean="0"/>
-              <a:t>R</a:t>
-            </a:r>
-            <a:r>
-              <a:rPr lang="en-US" sz="2000" dirty="0" err="1" smtClean="0"/>
-              <a:t>eadify</a:t>
+              <a:t>Readify</a:t>
             </a:r>
             <a:endParaRPr lang="en-US" sz="2000" dirty="0" smtClean="0"/>
           </a:p>
@@ -23527,15 +23474,7 @@
             </a:pPr>
             <a:r>
               <a:rPr lang="en-US" spc="-51" dirty="0" smtClean="0"/>
-              <a:t>Remember to add your IP address / the IP of your server to the </a:t>
-            </a:r>
-            <a:r>
-              <a:rPr lang="en-US" spc="-51" dirty="0" smtClean="0"/>
-              <a:t>f</a:t>
-            </a:r>
-            <a:r>
-              <a:rPr lang="en-US" spc="-51" dirty="0" smtClean="0"/>
-              <a:t>irewall rules if it’s outside Azure</a:t>
+              <a:t>Remember to add your IP address / the IP of your server to the firewall rules if it’s outside Azure</a:t>
             </a:r>
             <a:endParaRPr lang="en-US" spc="-51" dirty="0"/>
           </a:p>
@@ -24303,7 +24242,6 @@
               <a:rPr lang="en-US" sz="4000" dirty="0" smtClean="0"/>
               <a:t>Live demonstration</a:t>
             </a:r>
-            <a:endParaRPr lang="en-US" sz="4000" dirty="0" smtClean="0"/>
           </a:p>
         </p:txBody>
       </p:sp>
@@ -25620,11 +25558,7 @@
             </a:br>
             <a:r>
               <a:rPr lang="en-US" sz="4800" dirty="0" smtClean="0"/>
-              <a:t>Database </a:t>
-            </a:r>
-            <a:r>
-              <a:rPr lang="en-US" sz="4800" dirty="0" smtClean="0"/>
-              <a:t>Server</a:t>
+              <a:t>Database Server</a:t>
             </a:r>
             <a:endParaRPr lang="en-US" sz="4800" dirty="0"/>
           </a:p>
@@ -25893,6 +25827,115 @@
       </p:par>
     </p:tnLst>
   </p:timing>
+</p:sld>
+</file>
+
+<file path=ppt/slides/slide34.xml><?xml version="1.0" encoding="utf-8"?>
+<p:sld xmlns:a="http://schemas.openxmlformats.org/drawingml/2006/main" xmlns:r="http://schemas.openxmlformats.org/officeDocument/2006/relationships" xmlns:p="http://schemas.openxmlformats.org/presentationml/2006/main">
+  <p:cSld>
+    <p:spTree>
+      <p:nvGrpSpPr>
+        <p:cNvPr id="1" name=""/>
+        <p:cNvGrpSpPr/>
+        <p:nvPr/>
+      </p:nvGrpSpPr>
+      <p:grpSpPr>
+        <a:xfrm>
+          <a:off x="0" y="0"/>
+          <a:ext cx="0" cy="0"/>
+          <a:chOff x="0" y="0"/>
+          <a:chExt cx="0" cy="0"/>
+        </a:xfrm>
+      </p:grpSpPr>
+      <p:sp>
+        <p:nvSpPr>
+          <p:cNvPr id="2" name="Title 1"/>
+          <p:cNvSpPr>
+            <a:spLocks noGrp="1"/>
+          </p:cNvSpPr>
+          <p:nvPr>
+            <p:ph type="title"/>
+          </p:nvPr>
+        </p:nvSpPr>
+        <p:spPr/>
+        <p:txBody>
+          <a:bodyPr/>
+          <a:lstStyle/>
+          <a:p>
+            <a:r>
+              <a:rPr lang="en-AU" dirty="0" smtClean="0"/>
+              <a:t>Further Reading</a:t>
+            </a:r>
+            <a:endParaRPr lang="en-AU" dirty="0"/>
+          </a:p>
+        </p:txBody>
+      </p:sp>
+      <p:sp>
+        <p:nvSpPr>
+          <p:cNvPr id="3" name="Text Placeholder 2"/>
+          <p:cNvSpPr>
+            <a:spLocks noGrp="1"/>
+          </p:cNvSpPr>
+          <p:nvPr>
+            <p:ph type="body" sz="quarter" idx="10"/>
+          </p:nvPr>
+        </p:nvSpPr>
+        <p:spPr>
+          <a:xfrm>
+            <a:off x="519112" y="1447799"/>
+            <a:ext cx="11149013" cy="2885405"/>
+          </a:xfrm>
+        </p:spPr>
+        <p:txBody>
+          <a:bodyPr/>
+          <a:lstStyle/>
+          <a:p>
+            <a:pPr marL="574675" indent="-571500">
+              <a:buFont typeface="Arial" panose="020B0604020202020204" pitchFamily="34" charset="0"/>
+              <a:buChar char="•"/>
+            </a:pPr>
+            <a:r>
+              <a:rPr lang="en-AU" u="sng" dirty="0">
+                <a:hlinkClick r:id="rId2"/>
+              </a:rPr>
+              <a:t>http://</a:t>
+            </a:r>
+            <a:r>
+              <a:rPr lang="en-AU" u="sng" dirty="0" smtClean="0">
+                <a:hlinkClick r:id="rId2"/>
+              </a:rPr>
+              <a:t>social.technet.microsoft.com/wiki/contents/articles/995.windows-azure-sql-database-faq.aspx</a:t>
+            </a:r>
+            <a:endParaRPr lang="en-AU" u="sng" dirty="0" smtClean="0"/>
+          </a:p>
+          <a:p>
+            <a:pPr marL="574675" indent="-571500">
+              <a:buFont typeface="Arial" panose="020B0604020202020204" pitchFamily="34" charset="0"/>
+              <a:buChar char="•"/>
+            </a:pPr>
+            <a:r>
+              <a:rPr lang="en-AU">
+                <a:hlinkClick r:id="rId3"/>
+              </a:rPr>
+              <a:t>http://social.technet.microsoft.com/wiki/contents/articles/3507.windows-azure-sql-database-performance-and-elasticity-guide.aspx</a:t>
+            </a:r>
+            <a:endParaRPr lang="en-AU" dirty="0"/>
+          </a:p>
+        </p:txBody>
+      </p:sp>
+    </p:spTree>
+    <p:extLst>
+      <p:ext uri="{BB962C8B-B14F-4D97-AF65-F5344CB8AC3E}">
+        <p14:creationId xmlns:p14="http://schemas.microsoft.com/office/powerpoint/2010/main" val="2606010623"/>
+      </p:ext>
+    </p:extLst>
+  </p:cSld>
+  <p:clrMapOvr>
+    <a:masterClrMapping/>
+  </p:clrMapOvr>
+  <p:transition>
+    <p:fade/>
+  </p:transition>
 </p:sld>
 </file>
 

</xml_diff>

<commit_message>
Added sponsor slide and extra more info link to the presso
</commit_message>
<xml_diff>
--- a/Presentation.pptx
+++ b/Presentation.pptx
@@ -7,68 +7,69 @@
     <p:sldMasterId id="2147483802" r:id="rId3"/>
   </p:sldMasterIdLst>
   <p:notesMasterIdLst>
-    <p:notesMasterId r:id="rId38"/>
+    <p:notesMasterId r:id="rId39"/>
   </p:notesMasterIdLst>
   <p:handoutMasterIdLst>
-    <p:handoutMasterId r:id="rId39"/>
+    <p:handoutMasterId r:id="rId40"/>
   </p:handoutMasterIdLst>
   <p:sldIdLst>
     <p:sldId id="256" r:id="rId4"/>
-    <p:sldId id="306" r:id="rId5"/>
-    <p:sldId id="334" r:id="rId6"/>
-    <p:sldId id="320" r:id="rId7"/>
-    <p:sldId id="336" r:id="rId8"/>
-    <p:sldId id="327" r:id="rId9"/>
-    <p:sldId id="345" r:id="rId10"/>
-    <p:sldId id="305" r:id="rId11"/>
-    <p:sldId id="286" r:id="rId12"/>
-    <p:sldId id="340" r:id="rId13"/>
-    <p:sldId id="344" r:id="rId14"/>
-    <p:sldId id="341" r:id="rId15"/>
-    <p:sldId id="343" r:id="rId16"/>
-    <p:sldId id="342" r:id="rId17"/>
-    <p:sldId id="355" r:id="rId18"/>
-    <p:sldId id="347" r:id="rId19"/>
-    <p:sldId id="352" r:id="rId20"/>
-    <p:sldId id="353" r:id="rId21"/>
-    <p:sldId id="328" r:id="rId22"/>
-    <p:sldId id="350" r:id="rId23"/>
-    <p:sldId id="356" r:id="rId24"/>
-    <p:sldId id="351" r:id="rId25"/>
-    <p:sldId id="354" r:id="rId26"/>
-    <p:sldId id="348" r:id="rId27"/>
-    <p:sldId id="357" r:id="rId28"/>
-    <p:sldId id="358" r:id="rId29"/>
-    <p:sldId id="359" r:id="rId30"/>
-    <p:sldId id="360" r:id="rId31"/>
-    <p:sldId id="292" r:id="rId32"/>
-    <p:sldId id="349" r:id="rId33"/>
-    <p:sldId id="261" r:id="rId34"/>
-    <p:sldId id="346" r:id="rId35"/>
-    <p:sldId id="281" r:id="rId36"/>
-    <p:sldId id="361" r:id="rId37"/>
+    <p:sldId id="362" r:id="rId5"/>
+    <p:sldId id="306" r:id="rId6"/>
+    <p:sldId id="334" r:id="rId7"/>
+    <p:sldId id="320" r:id="rId8"/>
+    <p:sldId id="336" r:id="rId9"/>
+    <p:sldId id="327" r:id="rId10"/>
+    <p:sldId id="345" r:id="rId11"/>
+    <p:sldId id="305" r:id="rId12"/>
+    <p:sldId id="286" r:id="rId13"/>
+    <p:sldId id="340" r:id="rId14"/>
+    <p:sldId id="344" r:id="rId15"/>
+    <p:sldId id="341" r:id="rId16"/>
+    <p:sldId id="343" r:id="rId17"/>
+    <p:sldId id="342" r:id="rId18"/>
+    <p:sldId id="355" r:id="rId19"/>
+    <p:sldId id="347" r:id="rId20"/>
+    <p:sldId id="352" r:id="rId21"/>
+    <p:sldId id="353" r:id="rId22"/>
+    <p:sldId id="328" r:id="rId23"/>
+    <p:sldId id="350" r:id="rId24"/>
+    <p:sldId id="356" r:id="rId25"/>
+    <p:sldId id="351" r:id="rId26"/>
+    <p:sldId id="354" r:id="rId27"/>
+    <p:sldId id="348" r:id="rId28"/>
+    <p:sldId id="357" r:id="rId29"/>
+    <p:sldId id="358" r:id="rId30"/>
+    <p:sldId id="359" r:id="rId31"/>
+    <p:sldId id="360" r:id="rId32"/>
+    <p:sldId id="292" r:id="rId33"/>
+    <p:sldId id="349" r:id="rId34"/>
+    <p:sldId id="261" r:id="rId35"/>
+    <p:sldId id="346" r:id="rId36"/>
+    <p:sldId id="281" r:id="rId37"/>
+    <p:sldId id="361" r:id="rId38"/>
   </p:sldIdLst>
   <p:sldSz cx="12188825" cy="6858000"/>
   <p:notesSz cx="6858000" cy="9144000"/>
   <p:embeddedFontLst>
     <p:embeddedFont>
       <p:font typeface="Segoe UI" panose="020B0502040204020203" pitchFamily="34" charset="0"/>
-      <p:regular r:id="rId40"/>
-      <p:bold r:id="rId41"/>
-      <p:italic r:id="rId42"/>
-      <p:boldItalic r:id="rId43"/>
+      <p:regular r:id="rId41"/>
+      <p:bold r:id="rId42"/>
+      <p:italic r:id="rId43"/>
+      <p:boldItalic r:id="rId44"/>
     </p:embeddedFont>
     <p:embeddedFont>
       <p:font typeface="Segoe UI Light" panose="020B0502040204020203" pitchFamily="34" charset="0"/>
-      <p:regular r:id="rId44"/>
-      <p:italic r:id="rId45"/>
+      <p:regular r:id="rId45"/>
+      <p:italic r:id="rId46"/>
     </p:embeddedFont>
     <p:embeddedFont>
       <p:font typeface="Consolas" panose="020B0609020204030204" pitchFamily="49" charset="0"/>
-      <p:regular r:id="rId46"/>
-      <p:bold r:id="rId47"/>
-      <p:italic r:id="rId48"/>
-      <p:boldItalic r:id="rId49"/>
+      <p:regular r:id="rId47"/>
+      <p:bold r:id="rId48"/>
+      <p:italic r:id="rId49"/>
+      <p:boldItalic r:id="rId50"/>
     </p:embeddedFont>
   </p:embeddedFontLst>
   <p:defaultTextStyle>
@@ -363,7 +364,7 @@
                 <a:latin typeface="Segoe UI" pitchFamily="34" charset="0"/>
               </a:rPr>
               <a:pPr/>
-              <a:t>5/6/2013</a:t>
+              <a:t>5/13/2013</a:t>
             </a:fld>
             <a:endParaRPr lang="en-US" dirty="0">
               <a:latin typeface="Segoe UI" pitchFamily="34" charset="0"/>
@@ -579,7 +580,7 @@
             <a:fld id="{7C3FBCD4-166E-446F-AF18-7D4A0CF9AEF6}" type="datetimeFigureOut">
               <a:rPr lang="en-US" smtClean="0"/>
               <a:pPr/>
-              <a:t>5/6/2013</a:t>
+              <a:t>5/13/2013</a:t>
             </a:fld>
             <a:endParaRPr lang="en-US" dirty="0"/>
           </a:p>
@@ -994,7 +995,7 @@
             <a:fld id="{8B263312-38AA-4E1E-B2B5-0F8F122B24FE}" type="slidenum">
               <a:rPr lang="en-US" smtClean="0"/>
               <a:pPr/>
-              <a:t>2</a:t>
+              <a:t>3</a:t>
             </a:fld>
             <a:endParaRPr lang="en-US" dirty="0"/>
           </a:p>
@@ -1290,7 +1291,7 @@
             <a:fld id="{8B263312-38AA-4E1E-B2B5-0F8F122B24FE}" type="slidenum">
               <a:rPr lang="en-US" smtClean="0"/>
               <a:pPr/>
-              <a:t>19</a:t>
+              <a:t>20</a:t>
             </a:fld>
             <a:endParaRPr lang="en-US" dirty="0"/>
           </a:p>
@@ -1374,7 +1375,7 @@
           <a:p>
             <a:fld id="{1F743D80-E441-4DE6-AD4D-A3326A9B767E}" type="slidenum">
               <a:rPr lang="en-US" smtClean="0"/>
-              <a:t>24</a:t>
+              <a:t>25</a:t>
             </a:fld>
             <a:endParaRPr lang="en-US" dirty="0"/>
           </a:p>
@@ -1458,7 +1459,7 @@
           <a:p>
             <a:fld id="{1F743D80-E441-4DE6-AD4D-A3326A9B767E}" type="slidenum">
               <a:rPr lang="en-US" smtClean="0"/>
-              <a:t>29</a:t>
+              <a:t>30</a:t>
             </a:fld>
             <a:endParaRPr lang="en-US" dirty="0"/>
           </a:p>
@@ -1543,7 +1544,7 @@
             <a:fld id="{8B263312-38AA-4E1E-B2B5-0F8F122B24FE}" type="slidenum">
               <a:rPr lang="en-US" smtClean="0"/>
               <a:pPr/>
-              <a:t>30</a:t>
+              <a:t>31</a:t>
             </a:fld>
             <a:endParaRPr lang="en-US" dirty="0"/>
           </a:p>
@@ -1631,7 +1632,7 @@
           <a:p>
             <a:fld id="{6A737CDB-F497-4071-88DB-C233CAC28117}" type="slidenum">
               <a:rPr lang="en-US" smtClean="0"/>
-              <a:t>31</a:t>
+              <a:t>32</a:t>
             </a:fld>
             <a:endParaRPr lang="en-US" dirty="0"/>
           </a:p>
@@ -1719,7 +1720,7 @@
           <a:p>
             <a:fld id="{6A737CDB-F497-4071-88DB-C233CAC28117}" type="slidenum">
               <a:rPr lang="en-US" smtClean="0"/>
-              <a:t>32</a:t>
+              <a:t>33</a:t>
             </a:fld>
             <a:endParaRPr lang="en-US" dirty="0"/>
           </a:p>
@@ -1803,7 +1804,7 @@
           <a:p>
             <a:fld id="{1F743D80-E441-4DE6-AD4D-A3326A9B767E}" type="slidenum">
               <a:rPr lang="en-US" smtClean="0"/>
-              <a:t>3</a:t>
+              <a:t>4</a:t>
             </a:fld>
             <a:endParaRPr lang="en-US" dirty="0"/>
           </a:p>
@@ -1888,7 +1889,7 @@
             <a:fld id="{8B263312-38AA-4E1E-B2B5-0F8F122B24FE}" type="slidenum">
               <a:rPr lang="en-US" smtClean="0"/>
               <a:pPr/>
-              <a:t>4</a:t>
+              <a:t>5</a:t>
             </a:fld>
             <a:endParaRPr lang="en-US" dirty="0"/>
           </a:p>
@@ -2081,7 +2082,7 @@
             <a:fld id="{8B263312-38AA-4E1E-B2B5-0F8F122B24FE}" type="slidenum">
               <a:rPr lang="en-US" smtClean="0"/>
               <a:pPr/>
-              <a:t>5</a:t>
+              <a:t>6</a:t>
             </a:fld>
             <a:endParaRPr lang="en-US" dirty="0"/>
           </a:p>
@@ -2169,7 +2170,7 @@
             <a:fld id="{8B263312-38AA-4E1E-B2B5-0F8F122B24FE}" type="slidenum">
               <a:rPr lang="en-US" smtClean="0"/>
               <a:pPr/>
-              <a:t>6</a:t>
+              <a:t>7</a:t>
             </a:fld>
             <a:endParaRPr lang="en-US" dirty="0"/>
           </a:p>
@@ -2254,7 +2255,7 @@
             <a:fld id="{8B263312-38AA-4E1E-B2B5-0F8F122B24FE}" type="slidenum">
               <a:rPr lang="en-US" smtClean="0"/>
               <a:pPr/>
-              <a:t>8</a:t>
+              <a:t>9</a:t>
             </a:fld>
             <a:endParaRPr lang="en-US" dirty="0"/>
           </a:p>
@@ -2338,7 +2339,7 @@
           <a:p>
             <a:fld id="{1F743D80-E441-4DE6-AD4D-A3326A9B767E}" type="slidenum">
               <a:rPr lang="en-US" smtClean="0"/>
-              <a:t>9</a:t>
+              <a:t>10</a:t>
             </a:fld>
             <a:endParaRPr lang="en-US" dirty="0"/>
           </a:p>
@@ -2423,7 +2424,7 @@
             <a:fld id="{8B263312-38AA-4E1E-B2B5-0F8F122B24FE}" type="slidenum">
               <a:rPr lang="en-US" smtClean="0"/>
               <a:pPr/>
-              <a:t>11</a:t>
+              <a:t>12</a:t>
             </a:fld>
             <a:endParaRPr lang="en-US" dirty="0"/>
           </a:p>
@@ -2507,7 +2508,7 @@
           <a:p>
             <a:fld id="{1F743D80-E441-4DE6-AD4D-A3326A9B767E}" type="slidenum">
               <a:rPr lang="en-US" smtClean="0"/>
-              <a:t>16</a:t>
+              <a:t>17</a:t>
             </a:fld>
             <a:endParaRPr lang="en-US" dirty="0"/>
           </a:p>
@@ -7792,7 +7793,7 @@
             <a:fld id="{D7CE58A2-1EDC-45F0-BACE-E3574D82C834}" type="datetimeFigureOut">
               <a:rPr lang="en-US" smtClean="0"/>
               <a:pPr/>
-              <a:t>5/6/2013</a:t>
+              <a:t>5/13/2013</a:t>
             </a:fld>
             <a:endParaRPr lang="en-US"/>
           </a:p>
@@ -21991,29 +21992,6 @@
       </p:grpSpPr>
       <p:sp>
         <p:nvSpPr>
-          <p:cNvPr id="2" name="Title 1"/>
-          <p:cNvSpPr>
-            <a:spLocks noGrp="1"/>
-          </p:cNvSpPr>
-          <p:nvPr>
-            <p:ph type="title"/>
-          </p:nvPr>
-        </p:nvSpPr>
-        <p:spPr/>
-        <p:txBody>
-          <a:bodyPr/>
-          <a:lstStyle/>
-          <a:p>
-            <a:r>
-              <a:rPr lang="en-AU" dirty="0" smtClean="0"/>
-              <a:t>Pros</a:t>
-            </a:r>
-            <a:endParaRPr lang="en-AU" dirty="0"/>
-          </a:p>
-        </p:txBody>
-      </p:sp>
-      <p:sp>
-        <p:nvSpPr>
           <p:cNvPr id="3" name="Text Placeholder 2"/>
           <p:cNvSpPr>
             <a:spLocks noGrp="1"/>
@@ -22024,93 +22002,31 @@
         </p:nvSpPr>
         <p:spPr>
           <a:xfrm>
-            <a:off x="519112" y="1447799"/>
-            <a:ext cx="11149013" cy="4570482"/>
+            <a:off x="521208" y="2057400"/>
+            <a:ext cx="10693401" cy="1378644"/>
           </a:xfrm>
         </p:spPr>
         <p:txBody>
           <a:bodyPr/>
           <a:lstStyle/>
           <a:p>
-            <a:pPr marL="574675" indent="-571500">
-              <a:buFont typeface="Arial" panose="020B0604020202020204" pitchFamily="34" charset="0"/>
-              <a:buChar char="•"/>
-            </a:pPr>
-            <a:r>
-              <a:rPr lang="en-AU" dirty="0" smtClean="0"/>
-              <a:t>Latest version of SQL Server</a:t>
-            </a:r>
-          </a:p>
-          <a:p>
-            <a:pPr marL="574675" indent="-571500">
-              <a:buFont typeface="Arial" panose="020B0604020202020204" pitchFamily="34" charset="0"/>
-              <a:buChar char="•"/>
-            </a:pPr>
-            <a:r>
-              <a:rPr lang="en-AU" dirty="0" smtClean="0"/>
-              <a:t>Quick to provision</a:t>
-            </a:r>
-          </a:p>
-          <a:p>
-            <a:pPr marL="574675" indent="-571500">
-              <a:buFont typeface="Arial" panose="020B0604020202020204" pitchFamily="34" charset="0"/>
-              <a:buChar char="•"/>
-            </a:pPr>
-            <a:r>
-              <a:rPr lang="en-AU" dirty="0" smtClean="0"/>
-              <a:t>Managed service – ops taken care of</a:t>
-            </a:r>
-          </a:p>
-          <a:p>
-            <a:pPr marL="574675" indent="-571500">
-              <a:buFont typeface="Arial" panose="020B0604020202020204" pitchFamily="34" charset="0"/>
-              <a:buChar char="•"/>
-            </a:pPr>
-            <a:r>
-              <a:rPr lang="en-AU" dirty="0"/>
-              <a:t>State-of-the-art datacentre and security</a:t>
-            </a:r>
-          </a:p>
-          <a:p>
-            <a:pPr marL="574675" indent="-571500">
-              <a:buFont typeface="Arial" panose="020B0604020202020204" pitchFamily="34" charset="0"/>
-              <a:buChar char="•"/>
-            </a:pPr>
-            <a:r>
-              <a:rPr lang="en-AU" dirty="0" smtClean="0"/>
-              <a:t>Highly available and backed by SLA</a:t>
-            </a:r>
-          </a:p>
-          <a:p>
-            <a:pPr marL="574675" indent="-571500">
-              <a:buFont typeface="Arial" panose="020B0604020202020204" pitchFamily="34" charset="0"/>
-              <a:buChar char="•"/>
-            </a:pPr>
-            <a:r>
-              <a:rPr lang="en-AU" dirty="0" smtClean="0"/>
-              <a:t>Rich programmatic management / provisioning</a:t>
-            </a:r>
-          </a:p>
-          <a:p>
-            <a:pPr marL="574675" indent="-571500">
-              <a:buFont typeface="Arial" panose="020B0604020202020204" pitchFamily="34" charset="0"/>
-              <a:buChar char="•"/>
-            </a:pPr>
-            <a:r>
-              <a:rPr lang="en-AU" dirty="0" err="1" smtClean="0"/>
-              <a:t>DoS</a:t>
-            </a:r>
-            <a:r>
-              <a:rPr lang="en-AU" dirty="0" smtClean="0"/>
-              <a:t> protection</a:t>
-            </a:r>
+            <a:pPr indent="3175"/>
+            <a:r>
+              <a:rPr lang="en-US" dirty="0"/>
+              <a:t>What are the pros / </a:t>
+            </a:r>
+            <a:r>
+              <a:rPr lang="en-US" dirty="0" smtClean="0"/>
+              <a:t>cons / differences?</a:t>
+            </a:r>
+            <a:endParaRPr lang="en-US" dirty="0"/>
           </a:p>
         </p:txBody>
       </p:sp>
     </p:spTree>
     <p:extLst>
       <p:ext uri="{BB962C8B-B14F-4D97-AF65-F5344CB8AC3E}">
-        <p14:creationId xmlns:p14="http://schemas.microsoft.com/office/powerpoint/2010/main" val="1836865421"/>
+        <p14:creationId xmlns:p14="http://schemas.microsoft.com/office/powerpoint/2010/main" val="2331921382"/>
       </p:ext>
     </p:extLst>
   </p:cSld>
@@ -22120,6 +22036,13 @@
   <p:transition>
     <p:fade/>
   </p:transition>
+  <p:timing>
+    <p:tnLst>
+      <p:par>
+        <p:cTn id="1" dur="indefinite" restart="never" nodeType="tmRoot"/>
+      </p:par>
+    </p:tnLst>
+  </p:timing>
 </p:sld>
 </file>
 
@@ -22176,7 +22099,7 @@
         <p:spPr>
           <a:xfrm>
             <a:off x="519112" y="1447799"/>
-            <a:ext cx="11149013" cy="5009064"/>
+            <a:ext cx="11149013" cy="4570482"/>
           </a:xfrm>
         </p:spPr>
         <p:txBody>
@@ -22188,14 +22111,9 @@
               <a:buChar char="•"/>
             </a:pPr>
             <a:r>
-              <a:rPr lang="en-AU" dirty="0"/>
-              <a:t>Pay for </a:t>
-            </a:r>
-            <a:r>
               <a:rPr lang="en-AU" dirty="0" smtClean="0"/>
-              <a:t>use (don’t need to buy a license)</a:t>
-            </a:r>
-            <a:endParaRPr lang="en-AU" dirty="0"/>
+              <a:t>Latest version of SQL Server</a:t>
+            </a:r>
           </a:p>
           <a:p>
             <a:pPr marL="574675" indent="-571500">
@@ -22203,8 +22121,8 @@
               <a:buChar char="•"/>
             </a:pPr>
             <a:r>
-              <a:rPr lang="en-AU" dirty="0"/>
-              <a:t>Ability to scale data use over time</a:t>
+              <a:rPr lang="en-AU" dirty="0" smtClean="0"/>
+              <a:t>Quick to provision</a:t>
             </a:r>
           </a:p>
           <a:p>
@@ -22214,7 +22132,7 @@
             </a:pPr>
             <a:r>
               <a:rPr lang="en-AU" dirty="0" smtClean="0"/>
-              <a:t>Federations for easy horizontal scaling</a:t>
+              <a:t>Managed service – ops taken care of</a:t>
             </a:r>
           </a:p>
           <a:p>
@@ -22223,14 +22141,9 @@
               <a:buChar char="•"/>
             </a:pPr>
             <a:r>
-              <a:rPr lang="en-AU" dirty="0" smtClean="0"/>
-              <a:t>SQL Azure Data Sync provides easy way of syncing data to/from </a:t>
-            </a:r>
-            <a:r>
-              <a:rPr lang="en-AU" dirty="0" err="1" smtClean="0"/>
-              <a:t>on-premise</a:t>
-            </a:r>
-            <a:endParaRPr lang="en-AU" dirty="0" smtClean="0"/>
+              <a:rPr lang="en-AU" dirty="0"/>
+              <a:t>State-of-the-art datacentre and security</a:t>
+            </a:r>
           </a:p>
           <a:p>
             <a:pPr marL="574675" indent="-571500">
@@ -22239,7 +22152,7 @@
             </a:pPr>
             <a:r>
               <a:rPr lang="en-AU" dirty="0" smtClean="0"/>
-              <a:t>You can store backups in Blob storage on the other side of the world easily</a:t>
+              <a:t>Highly available and backed by SLA</a:t>
             </a:r>
           </a:p>
           <a:p>
@@ -22249,16 +22162,29 @@
             </a:pPr>
             <a:r>
               <a:rPr lang="en-AU" dirty="0" smtClean="0"/>
-              <a:t>Existing tools / libs can connect to it</a:t>
-            </a:r>
-            <a:endParaRPr lang="en-AU" dirty="0"/>
+              <a:t>Rich programmatic management / provisioning</a:t>
+            </a:r>
+          </a:p>
+          <a:p>
+            <a:pPr marL="574675" indent="-571500">
+              <a:buFont typeface="Arial" panose="020B0604020202020204" pitchFamily="34" charset="0"/>
+              <a:buChar char="•"/>
+            </a:pPr>
+            <a:r>
+              <a:rPr lang="en-AU" dirty="0" err="1" smtClean="0"/>
+              <a:t>DoS</a:t>
+            </a:r>
+            <a:r>
+              <a:rPr lang="en-AU" dirty="0" smtClean="0"/>
+              <a:t> protection</a:t>
+            </a:r>
           </a:p>
         </p:txBody>
       </p:sp>
     </p:spTree>
     <p:extLst>
       <p:ext uri="{BB962C8B-B14F-4D97-AF65-F5344CB8AC3E}">
-        <p14:creationId xmlns:p14="http://schemas.microsoft.com/office/powerpoint/2010/main" val="3616795275"/>
+        <p14:creationId xmlns:p14="http://schemas.microsoft.com/office/powerpoint/2010/main" val="1836865421"/>
       </p:ext>
     </p:extLst>
   </p:cSld>
@@ -22305,7 +22231,7 @@
           <a:p>
             <a:r>
               <a:rPr lang="en-AU" dirty="0" smtClean="0"/>
-              <a:t>Differences</a:t>
+              <a:t>Pros</a:t>
             </a:r>
             <a:endParaRPr lang="en-AU" dirty="0"/>
           </a:p>
@@ -22324,7 +22250,7 @@
         <p:spPr>
           <a:xfrm>
             <a:off x="519112" y="1447799"/>
-            <a:ext cx="11149013" cy="4570482"/>
+            <a:ext cx="11149013" cy="5009064"/>
           </a:xfrm>
         </p:spPr>
         <p:txBody>
@@ -22336,9 +22262,14 @@
               <a:buChar char="•"/>
             </a:pPr>
             <a:r>
+              <a:rPr lang="en-AU" dirty="0"/>
+              <a:t>Pay for </a:t>
+            </a:r>
+            <a:r>
               <a:rPr lang="en-AU" dirty="0" smtClean="0"/>
-              <a:t>No use command – one database per connection</a:t>
-            </a:r>
+              <a:t>use (don’t need to buy a license)</a:t>
+            </a:r>
+            <a:endParaRPr lang="en-AU" dirty="0"/>
           </a:p>
           <a:p>
             <a:pPr marL="574675" indent="-571500">
@@ -22346,8 +22277,8 @@
               <a:buChar char="•"/>
             </a:pPr>
             <a:r>
-              <a:rPr lang="en-AU" dirty="0" smtClean="0"/>
-              <a:t>No distributed transactions</a:t>
+              <a:rPr lang="en-AU" dirty="0"/>
+              <a:t>Ability to scale data use over time</a:t>
             </a:r>
           </a:p>
           <a:p>
@@ -22357,11 +22288,7 @@
             </a:pPr>
             <a:r>
               <a:rPr lang="en-AU" dirty="0" smtClean="0"/>
-              <a:t>No distributed </a:t>
-            </a:r>
-            <a:r>
-              <a:rPr lang="en-AU" dirty="0"/>
-              <a:t>views</a:t>
+              <a:t>Federations for easy horizontal scaling</a:t>
             </a:r>
           </a:p>
           <a:p>
@@ -22371,12 +22298,13 @@
             </a:pPr>
             <a:r>
               <a:rPr lang="en-AU" dirty="0" smtClean="0"/>
-              <a:t>No service </a:t>
-            </a:r>
-            <a:r>
-              <a:rPr lang="en-AU" dirty="0"/>
-              <a:t>Broker</a:t>
-            </a:r>
+              <a:t>SQL Azure Data Sync provides easy way of syncing data to/from </a:t>
+            </a:r>
+            <a:r>
+              <a:rPr lang="en-AU" dirty="0" err="1" smtClean="0"/>
+              <a:t>on-premise</a:t>
+            </a:r>
+            <a:endParaRPr lang="en-AU" dirty="0" smtClean="0"/>
           </a:p>
           <a:p>
             <a:pPr marL="574675" indent="-571500">
@@ -22385,17 +22313,8 @@
             </a:pPr>
             <a:r>
               <a:rPr lang="en-AU" dirty="0" smtClean="0"/>
-              <a:t>No Common </a:t>
-            </a:r>
-            <a:r>
-              <a:rPr lang="en-AU" dirty="0"/>
-              <a:t>Language Runtime (CLR</a:t>
-            </a:r>
-            <a:r>
-              <a:rPr lang="en-AU" dirty="0" smtClean="0"/>
-              <a:t>)</a:t>
-            </a:r>
-            <a:endParaRPr lang="en-AU" dirty="0"/>
+              <a:t>You can store backups in Blob storage on the other side of the world easily</a:t>
+            </a:r>
           </a:p>
           <a:p>
             <a:pPr marL="574675" indent="-571500">
@@ -22404,21 +22323,7 @@
             </a:pPr>
             <a:r>
               <a:rPr lang="en-AU" dirty="0" smtClean="0"/>
-              <a:t>No SQL </a:t>
-            </a:r>
-            <a:r>
-              <a:rPr lang="en-AU" dirty="0"/>
-              <a:t>Agent</a:t>
-            </a:r>
-          </a:p>
-          <a:p>
-            <a:pPr marL="574675" indent="-571500">
-              <a:buFont typeface="Arial" panose="020B0604020202020204" pitchFamily="34" charset="0"/>
-              <a:buChar char="•"/>
-            </a:pPr>
-            <a:r>
-              <a:rPr lang="en-AU" dirty="0" smtClean="0"/>
-              <a:t>No Native Encryption (TDE)</a:t>
+              <a:t>Existing tools / libs can connect to it</a:t>
             </a:r>
             <a:endParaRPr lang="en-AU" dirty="0"/>
           </a:p>
@@ -22427,7 +22332,7 @@
     </p:spTree>
     <p:extLst>
       <p:ext uri="{BB962C8B-B14F-4D97-AF65-F5344CB8AC3E}">
-        <p14:creationId xmlns:p14="http://schemas.microsoft.com/office/powerpoint/2010/main" val="3196573837"/>
+        <p14:creationId xmlns:p14="http://schemas.microsoft.com/office/powerpoint/2010/main" val="3616795275"/>
       </p:ext>
     </p:extLst>
   </p:cSld>
@@ -22493,7 +22398,7 @@
         <p:spPr>
           <a:xfrm>
             <a:off x="519112" y="1447799"/>
-            <a:ext cx="11149013" cy="5239896"/>
+            <a:ext cx="11149013" cy="4570482"/>
           </a:xfrm>
         </p:spPr>
         <p:txBody>
@@ -22505,8 +22410,8 @@
               <a:buChar char="•"/>
             </a:pPr>
             <a:r>
-              <a:rPr lang="en-AU" dirty="0"/>
-              <a:t>Different backup / restore</a:t>
+              <a:rPr lang="en-AU" dirty="0" smtClean="0"/>
+              <a:t>No use command – one database per connection</a:t>
             </a:r>
           </a:p>
           <a:p>
@@ -22515,8 +22420,8 @@
               <a:buChar char="•"/>
             </a:pPr>
             <a:r>
-              <a:rPr lang="en-AU" dirty="0"/>
-              <a:t>No transactional replication or log shipping</a:t>
+              <a:rPr lang="en-AU" dirty="0" smtClean="0"/>
+              <a:t>No distributed transactions</a:t>
             </a:r>
           </a:p>
           <a:p>
@@ -22525,8 +22430,12 @@
               <a:buChar char="•"/>
             </a:pPr>
             <a:r>
+              <a:rPr lang="en-AU" dirty="0" smtClean="0"/>
+              <a:t>No distributed </a:t>
+            </a:r>
+            <a:r>
               <a:rPr lang="en-AU" dirty="0"/>
-              <a:t>Must have single clustered index on all tables</a:t>
+              <a:t>views</a:t>
             </a:r>
           </a:p>
           <a:p>
@@ -22535,8 +22444,12 @@
               <a:buChar char="•"/>
             </a:pPr>
             <a:r>
+              <a:rPr lang="en-AU" dirty="0" smtClean="0"/>
+              <a:t>No service </a:t>
+            </a:r>
+            <a:r>
               <a:rPr lang="en-AU" dirty="0"/>
-              <a:t>Subset of system views available</a:t>
+              <a:t>Broker</a:t>
             </a:r>
           </a:p>
           <a:p>
@@ -22545,9 +22458,18 @@
               <a:buChar char="•"/>
             </a:pPr>
             <a:r>
+              <a:rPr lang="en-AU" dirty="0" smtClean="0"/>
+              <a:t>No Common </a:t>
+            </a:r>
+            <a:r>
               <a:rPr lang="en-AU" dirty="0"/>
-              <a:t>Connections will be automatically closed</a:t>
-            </a:r>
+              <a:t>Language Runtime (CLR</a:t>
+            </a:r>
+            <a:r>
+              <a:rPr lang="en-AU" dirty="0" smtClean="0"/>
+              <a:t>)</a:t>
+            </a:r>
+            <a:endParaRPr lang="en-AU" dirty="0"/>
           </a:p>
           <a:p>
             <a:pPr marL="574675" indent="-571500">
@@ -22555,12 +22477,12 @@
               <a:buChar char="•"/>
             </a:pPr>
             <a:r>
+              <a:rPr lang="en-AU" dirty="0" smtClean="0"/>
+              <a:t>No SQL </a:t>
+            </a:r>
+            <a:r>
               <a:rPr lang="en-AU" dirty="0"/>
-              <a:t>No </a:t>
-            </a:r>
-            <a:r>
-              <a:rPr lang="en-AU" dirty="0" smtClean="0"/>
-              <a:t>SSIS</a:t>
+              <a:t>Agent</a:t>
             </a:r>
           </a:p>
           <a:p>
@@ -22570,11 +22492,8 @@
             </a:pPr>
             <a:r>
               <a:rPr lang="en-AU" dirty="0" smtClean="0"/>
-              <a:t>No integrated security</a:t>
-            </a:r>
-            <a:endParaRPr lang="en-AU" dirty="0"/>
-          </a:p>
-          <a:p>
+              <a:t>No Native Encryption (TDE)</a:t>
+            </a:r>
             <a:endParaRPr lang="en-AU" dirty="0"/>
           </a:p>
         </p:txBody>
@@ -22582,7 +22501,7 @@
     </p:spTree>
     <p:extLst>
       <p:ext uri="{BB962C8B-B14F-4D97-AF65-F5344CB8AC3E}">
-        <p14:creationId xmlns:p14="http://schemas.microsoft.com/office/powerpoint/2010/main" val="3436458688"/>
+        <p14:creationId xmlns:p14="http://schemas.microsoft.com/office/powerpoint/2010/main" val="3196573837"/>
       </p:ext>
     </p:extLst>
   </p:cSld>
@@ -22629,7 +22548,7 @@
           <a:p>
             <a:r>
               <a:rPr lang="en-AU" dirty="0" smtClean="0"/>
-              <a:t>Cons</a:t>
+              <a:t>Differences</a:t>
             </a:r>
             <a:endParaRPr lang="en-AU" dirty="0"/>
           </a:p>
@@ -22648,7 +22567,7 @@
         <p:spPr>
           <a:xfrm>
             <a:off x="519112" y="1447799"/>
-            <a:ext cx="11149013" cy="4339650"/>
+            <a:ext cx="11149013" cy="5239896"/>
           </a:xfrm>
         </p:spPr>
         <p:txBody>
@@ -22661,7 +22580,7 @@
             </a:pPr>
             <a:r>
               <a:rPr lang="en-AU" dirty="0"/>
-              <a:t>Max 150 GB</a:t>
+              <a:t>Different backup / restore</a:t>
             </a:r>
           </a:p>
           <a:p>
@@ -22670,8 +22589,8 @@
               <a:buChar char="•"/>
             </a:pPr>
             <a:r>
-              <a:rPr lang="en-AU" dirty="0" smtClean="0"/>
-              <a:t>Pay for data not computation – no guarantee of resources</a:t>
+              <a:rPr lang="en-AU" dirty="0"/>
+              <a:t>No transactional replication or log shipping</a:t>
             </a:r>
           </a:p>
           <a:p>
@@ -22680,10 +22599,9 @@
               <a:buChar char="•"/>
             </a:pPr>
             <a:r>
-              <a:rPr lang="en-AU" dirty="0" smtClean="0"/>
-              <a:t>Upper limit for vertical scaling of throughput</a:t>
-            </a:r>
-            <a:endParaRPr lang="en-AU" dirty="0"/>
+              <a:rPr lang="en-AU" dirty="0"/>
+              <a:t>Must have single clustered index on all tables</a:t>
+            </a:r>
           </a:p>
           <a:p>
             <a:pPr marL="574675" indent="-571500">
@@ -22691,8 +22609,8 @@
               <a:buChar char="•"/>
             </a:pPr>
             <a:r>
-              <a:rPr lang="en-AU" dirty="0" smtClean="0"/>
-              <a:t>Need to deal with transient errors</a:t>
+              <a:rPr lang="en-AU" dirty="0"/>
+              <a:t>Subset of system views available</a:t>
             </a:r>
           </a:p>
           <a:p>
@@ -22701,16 +22619,44 @@
               <a:buChar char="•"/>
             </a:pPr>
             <a:r>
+              <a:rPr lang="en-AU" dirty="0"/>
+              <a:t>Connections will be automatically closed</a:t>
+            </a:r>
+          </a:p>
+          <a:p>
+            <a:pPr marL="574675" indent="-571500">
+              <a:buFont typeface="Arial" panose="020B0604020202020204" pitchFamily="34" charset="0"/>
+              <a:buChar char="•"/>
+            </a:pPr>
+            <a:r>
+              <a:rPr lang="en-AU" dirty="0"/>
+              <a:t>No </a:t>
+            </a:r>
+            <a:r>
               <a:rPr lang="en-AU" dirty="0" smtClean="0"/>
-              <a:t>More advanced use cases not supported (broker, agent, TDE, DTC etc.)</a:t>
-            </a:r>
+              <a:t>SSIS</a:t>
+            </a:r>
+          </a:p>
+          <a:p>
+            <a:pPr marL="574675" indent="-571500">
+              <a:buFont typeface="Arial" panose="020B0604020202020204" pitchFamily="34" charset="0"/>
+              <a:buChar char="•"/>
+            </a:pPr>
+            <a:r>
+              <a:rPr lang="en-AU" dirty="0" smtClean="0"/>
+              <a:t>No integrated security</a:t>
+            </a:r>
+            <a:endParaRPr lang="en-AU" dirty="0"/>
+          </a:p>
+          <a:p>
+            <a:endParaRPr lang="en-AU" dirty="0"/>
           </a:p>
         </p:txBody>
       </p:sp>
     </p:spTree>
     <p:extLst>
       <p:ext uri="{BB962C8B-B14F-4D97-AF65-F5344CB8AC3E}">
-        <p14:creationId xmlns:p14="http://schemas.microsoft.com/office/powerpoint/2010/main" val="2470106224"/>
+        <p14:creationId xmlns:p14="http://schemas.microsoft.com/office/powerpoint/2010/main" val="3436458688"/>
       </p:ext>
     </p:extLst>
   </p:cSld>
@@ -22776,6 +22722,134 @@
         <p:spPr>
           <a:xfrm>
             <a:off x="519112" y="1447799"/>
+            <a:ext cx="11149013" cy="4339650"/>
+          </a:xfrm>
+        </p:spPr>
+        <p:txBody>
+          <a:bodyPr/>
+          <a:lstStyle/>
+          <a:p>
+            <a:pPr marL="574675" indent="-571500">
+              <a:buFont typeface="Arial" panose="020B0604020202020204" pitchFamily="34" charset="0"/>
+              <a:buChar char="•"/>
+            </a:pPr>
+            <a:r>
+              <a:rPr lang="en-AU" dirty="0"/>
+              <a:t>Max 150 GB</a:t>
+            </a:r>
+          </a:p>
+          <a:p>
+            <a:pPr marL="574675" indent="-571500">
+              <a:buFont typeface="Arial" panose="020B0604020202020204" pitchFamily="34" charset="0"/>
+              <a:buChar char="•"/>
+            </a:pPr>
+            <a:r>
+              <a:rPr lang="en-AU" dirty="0" smtClean="0"/>
+              <a:t>Pay for data not computation – no guarantee of resources</a:t>
+            </a:r>
+          </a:p>
+          <a:p>
+            <a:pPr marL="574675" indent="-571500">
+              <a:buFont typeface="Arial" panose="020B0604020202020204" pitchFamily="34" charset="0"/>
+              <a:buChar char="•"/>
+            </a:pPr>
+            <a:r>
+              <a:rPr lang="en-AU" dirty="0" smtClean="0"/>
+              <a:t>Upper limit for vertical scaling of throughput</a:t>
+            </a:r>
+            <a:endParaRPr lang="en-AU" dirty="0"/>
+          </a:p>
+          <a:p>
+            <a:pPr marL="574675" indent="-571500">
+              <a:buFont typeface="Arial" panose="020B0604020202020204" pitchFamily="34" charset="0"/>
+              <a:buChar char="•"/>
+            </a:pPr>
+            <a:r>
+              <a:rPr lang="en-AU" dirty="0" smtClean="0"/>
+              <a:t>Need to deal with transient errors</a:t>
+            </a:r>
+          </a:p>
+          <a:p>
+            <a:pPr marL="574675" indent="-571500">
+              <a:buFont typeface="Arial" panose="020B0604020202020204" pitchFamily="34" charset="0"/>
+              <a:buChar char="•"/>
+            </a:pPr>
+            <a:r>
+              <a:rPr lang="en-AU" dirty="0" smtClean="0"/>
+              <a:t>More advanced use cases not supported (broker, agent, TDE, DTC etc.)</a:t>
+            </a:r>
+          </a:p>
+        </p:txBody>
+      </p:sp>
+    </p:spTree>
+    <p:extLst>
+      <p:ext uri="{BB962C8B-B14F-4D97-AF65-F5344CB8AC3E}">
+        <p14:creationId xmlns:p14="http://schemas.microsoft.com/office/powerpoint/2010/main" val="2470106224"/>
+      </p:ext>
+    </p:extLst>
+  </p:cSld>
+  <p:clrMapOvr>
+    <a:masterClrMapping/>
+  </p:clrMapOvr>
+  <p:transition>
+    <p:fade/>
+  </p:transition>
+</p:sld>
+</file>
+
+<file path=ppt/slides/slide16.xml><?xml version="1.0" encoding="utf-8"?>
+<p:sld xmlns:a="http://schemas.openxmlformats.org/drawingml/2006/main" xmlns:r="http://schemas.openxmlformats.org/officeDocument/2006/relationships" xmlns:p="http://schemas.openxmlformats.org/presentationml/2006/main">
+  <p:cSld>
+    <p:spTree>
+      <p:nvGrpSpPr>
+        <p:cNvPr id="1" name=""/>
+        <p:cNvGrpSpPr/>
+        <p:nvPr/>
+      </p:nvGrpSpPr>
+      <p:grpSpPr>
+        <a:xfrm>
+          <a:off x="0" y="0"/>
+          <a:ext cx="0" cy="0"/>
+          <a:chOff x="0" y="0"/>
+          <a:chExt cx="0" cy="0"/>
+        </a:xfrm>
+      </p:grpSpPr>
+      <p:sp>
+        <p:nvSpPr>
+          <p:cNvPr id="2" name="Title 1"/>
+          <p:cNvSpPr>
+            <a:spLocks noGrp="1"/>
+          </p:cNvSpPr>
+          <p:nvPr>
+            <p:ph type="title"/>
+          </p:nvPr>
+        </p:nvSpPr>
+        <p:spPr/>
+        <p:txBody>
+          <a:bodyPr/>
+          <a:lstStyle/>
+          <a:p>
+            <a:r>
+              <a:rPr lang="en-AU" dirty="0" smtClean="0"/>
+              <a:t>Cons</a:t>
+            </a:r>
+            <a:endParaRPr lang="en-AU" dirty="0"/>
+          </a:p>
+        </p:txBody>
+      </p:sp>
+      <p:sp>
+        <p:nvSpPr>
+          <p:cNvPr id="3" name="Text Placeholder 2"/>
+          <p:cNvSpPr>
+            <a:spLocks noGrp="1"/>
+          </p:cNvSpPr>
+          <p:nvPr>
+            <p:ph type="body" sz="quarter" idx="10"/>
+          </p:nvPr>
+        </p:nvSpPr>
+        <p:spPr>
+          <a:xfrm>
+            <a:off x="519112" y="1447799"/>
             <a:ext cx="11149013" cy="2446824"/>
           </a:xfrm>
         </p:spPr>
@@ -22835,7 +22909,7 @@
 </p:sld>
 </file>
 
-<file path=ppt/slides/slide16.xml><?xml version="1.0" encoding="utf-8"?>
+<file path=ppt/slides/slide17.xml><?xml version="1.0" encoding="utf-8"?>
 <p:sld xmlns:a="http://schemas.openxmlformats.org/drawingml/2006/main" xmlns:r="http://schemas.openxmlformats.org/officeDocument/2006/relationships" xmlns:p="http://schemas.openxmlformats.org/presentationml/2006/main">
   <p:cSld>
     <p:spTree>
@@ -22903,114 +22977,6 @@
 </p:sld>
 </file>
 
-<file path=ppt/slides/slide17.xml><?xml version="1.0" encoding="utf-8"?>
-<p:sld xmlns:a="http://schemas.openxmlformats.org/drawingml/2006/main" xmlns:r="http://schemas.openxmlformats.org/officeDocument/2006/relationships" xmlns:p="http://schemas.openxmlformats.org/presentationml/2006/main">
-  <p:cSld>
-    <p:spTree>
-      <p:nvGrpSpPr>
-        <p:cNvPr id="1" name=""/>
-        <p:cNvGrpSpPr/>
-        <p:nvPr/>
-      </p:nvGrpSpPr>
-      <p:grpSpPr>
-        <a:xfrm>
-          <a:off x="0" y="0"/>
-          <a:ext cx="0" cy="0"/>
-          <a:chOff x="0" y="0"/>
-          <a:chExt cx="0" cy="0"/>
-        </a:xfrm>
-      </p:grpSpPr>
-      <p:sp>
-        <p:nvSpPr>
-          <p:cNvPr id="2" name="Title 1"/>
-          <p:cNvSpPr>
-            <a:spLocks noGrp="1"/>
-          </p:cNvSpPr>
-          <p:nvPr>
-            <p:ph type="title"/>
-          </p:nvPr>
-        </p:nvSpPr>
-        <p:spPr/>
-        <p:txBody>
-          <a:bodyPr/>
-          <a:lstStyle/>
-          <a:p>
-            <a:r>
-              <a:rPr lang="en-AU" dirty="0" smtClean="0"/>
-              <a:t>When to provision new servers / DBs</a:t>
-            </a:r>
-            <a:endParaRPr lang="en-AU" dirty="0"/>
-          </a:p>
-        </p:txBody>
-      </p:sp>
-      <p:sp>
-        <p:nvSpPr>
-          <p:cNvPr id="3" name="Text Placeholder 2"/>
-          <p:cNvSpPr>
-            <a:spLocks noGrp="1"/>
-          </p:cNvSpPr>
-          <p:nvPr>
-            <p:ph type="body" sz="quarter" idx="10"/>
-          </p:nvPr>
-        </p:nvSpPr>
-        <p:spPr>
-          <a:xfrm>
-            <a:off x="519112" y="1447799"/>
-            <a:ext cx="11149013" cy="3670236"/>
-          </a:xfrm>
-        </p:spPr>
-        <p:txBody>
-          <a:bodyPr/>
-          <a:lstStyle/>
-          <a:p>
-            <a:r>
-              <a:rPr lang="en-AU" dirty="0" err="1" smtClean="0"/>
-              <a:t>Todo</a:t>
-            </a:r>
-            <a:endParaRPr lang="en-AU" dirty="0" smtClean="0"/>
-          </a:p>
-          <a:p>
-            <a:r>
-              <a:rPr lang="en-AU" dirty="0" smtClean="0"/>
-              <a:t>Server: single set of firewall rules, single set of user accounts, single data centre</a:t>
-            </a:r>
-          </a:p>
-          <a:p>
-            <a:endParaRPr lang="en-AU" dirty="0"/>
-          </a:p>
-          <a:p>
-            <a:r>
-              <a:rPr lang="en-AU" dirty="0" smtClean="0"/>
-              <a:t>Use single </a:t>
-            </a:r>
-            <a:r>
-              <a:rPr lang="en-AU" dirty="0" err="1" smtClean="0"/>
-              <a:t>db</a:t>
-            </a:r>
-            <a:r>
-              <a:rPr lang="en-AU" dirty="0" smtClean="0"/>
-              <a:t> if you are multi-tenanting or you use schemas to separate between applications</a:t>
-            </a:r>
-            <a:endParaRPr lang="en-AU" dirty="0"/>
-          </a:p>
-        </p:txBody>
-      </p:sp>
-    </p:spTree>
-    <p:extLst>
-      <p:ext uri="{BB962C8B-B14F-4D97-AF65-F5344CB8AC3E}">
-        <p14:creationId xmlns:p14="http://schemas.microsoft.com/office/powerpoint/2010/main" val="3704911158"/>
-      </p:ext>
-    </p:extLst>
-  </p:cSld>
-  <p:clrMapOvr>
-    <a:masterClrMapping/>
-  </p:clrMapOvr>
-  <p:transition>
-    <p:fade/>
-  </p:transition>
-</p:sld>
-</file>
-
 <file path=ppt/slides/slide18.xml><?xml version="1.0" encoding="utf-8"?>
 <p:sld xmlns:a="http://schemas.openxmlformats.org/drawingml/2006/main" xmlns:r="http://schemas.openxmlformats.org/officeDocument/2006/relationships" xmlns:p="http://schemas.openxmlformats.org/presentationml/2006/main">
   <p:cSld>
@@ -23045,6 +23011,114 @@
           <a:p>
             <a:r>
               <a:rPr lang="en-AU" dirty="0" smtClean="0"/>
+              <a:t>When to provision new servers / DBs</a:t>
+            </a:r>
+            <a:endParaRPr lang="en-AU" dirty="0"/>
+          </a:p>
+        </p:txBody>
+      </p:sp>
+      <p:sp>
+        <p:nvSpPr>
+          <p:cNvPr id="3" name="Text Placeholder 2"/>
+          <p:cNvSpPr>
+            <a:spLocks noGrp="1"/>
+          </p:cNvSpPr>
+          <p:nvPr>
+            <p:ph type="body" sz="quarter" idx="10"/>
+          </p:nvPr>
+        </p:nvSpPr>
+        <p:spPr>
+          <a:xfrm>
+            <a:off x="519112" y="1447799"/>
+            <a:ext cx="11149013" cy="3670236"/>
+          </a:xfrm>
+        </p:spPr>
+        <p:txBody>
+          <a:bodyPr/>
+          <a:lstStyle/>
+          <a:p>
+            <a:r>
+              <a:rPr lang="en-AU" dirty="0" err="1" smtClean="0"/>
+              <a:t>Todo</a:t>
+            </a:r>
+            <a:endParaRPr lang="en-AU" dirty="0" smtClean="0"/>
+          </a:p>
+          <a:p>
+            <a:r>
+              <a:rPr lang="en-AU" dirty="0" smtClean="0"/>
+              <a:t>Server: single set of firewall rules, single set of user accounts, single data centre</a:t>
+            </a:r>
+          </a:p>
+          <a:p>
+            <a:endParaRPr lang="en-AU" dirty="0"/>
+          </a:p>
+          <a:p>
+            <a:r>
+              <a:rPr lang="en-AU" dirty="0" smtClean="0"/>
+              <a:t>Use single </a:t>
+            </a:r>
+            <a:r>
+              <a:rPr lang="en-AU" dirty="0" err="1" smtClean="0"/>
+              <a:t>db</a:t>
+            </a:r>
+            <a:r>
+              <a:rPr lang="en-AU" dirty="0" smtClean="0"/>
+              <a:t> if you are multi-tenanting or you use schemas to separate between applications</a:t>
+            </a:r>
+            <a:endParaRPr lang="en-AU" dirty="0"/>
+          </a:p>
+        </p:txBody>
+      </p:sp>
+    </p:spTree>
+    <p:extLst>
+      <p:ext uri="{BB962C8B-B14F-4D97-AF65-F5344CB8AC3E}">
+        <p14:creationId xmlns:p14="http://schemas.microsoft.com/office/powerpoint/2010/main" val="3704911158"/>
+      </p:ext>
+    </p:extLst>
+  </p:cSld>
+  <p:clrMapOvr>
+    <a:masterClrMapping/>
+  </p:clrMapOvr>
+  <p:transition>
+    <p:fade/>
+  </p:transition>
+</p:sld>
+</file>
+
+<file path=ppt/slides/slide19.xml><?xml version="1.0" encoding="utf-8"?>
+<p:sld xmlns:a="http://schemas.openxmlformats.org/drawingml/2006/main" xmlns:r="http://schemas.openxmlformats.org/officeDocument/2006/relationships" xmlns:p="http://schemas.openxmlformats.org/presentationml/2006/main">
+  <p:cSld>
+    <p:spTree>
+      <p:nvGrpSpPr>
+        <p:cNvPr id="1" name=""/>
+        <p:cNvGrpSpPr/>
+        <p:nvPr/>
+      </p:nvGrpSpPr>
+      <p:grpSpPr>
+        <a:xfrm>
+          <a:off x="0" y="0"/>
+          <a:ext cx="0" cy="0"/>
+          <a:chOff x="0" y="0"/>
+          <a:chExt cx="0" cy="0"/>
+        </a:xfrm>
+      </p:grpSpPr>
+      <p:sp>
+        <p:nvSpPr>
+          <p:cNvPr id="2" name="Title 1"/>
+          <p:cNvSpPr>
+            <a:spLocks noGrp="1"/>
+          </p:cNvSpPr>
+          <p:nvPr>
+            <p:ph type="title"/>
+          </p:nvPr>
+        </p:nvSpPr>
+        <p:spPr/>
+        <p:txBody>
+          <a:bodyPr/>
+          <a:lstStyle/>
+          <a:p>
+            <a:r>
+              <a:rPr lang="en-AU" dirty="0" smtClean="0"/>
               <a:t>Which DB edition to use?</a:t>
             </a:r>
             <a:endParaRPr lang="en-AU" dirty="0"/>
@@ -23102,7 +23176,178 @@
 </p:sld>
 </file>
 
-<file path=ppt/slides/slide19.xml><?xml version="1.0" encoding="utf-8"?>
+<file path=ppt/slides/slide2.xml><?xml version="1.0" encoding="utf-8"?>
+<p:sld xmlns:a="http://schemas.openxmlformats.org/drawingml/2006/main" xmlns:r="http://schemas.openxmlformats.org/officeDocument/2006/relationships" xmlns:p="http://schemas.openxmlformats.org/presentationml/2006/main">
+  <p:cSld>
+    <p:spTree>
+      <p:nvGrpSpPr>
+        <p:cNvPr id="1" name=""/>
+        <p:cNvGrpSpPr/>
+        <p:nvPr/>
+      </p:nvGrpSpPr>
+      <p:grpSpPr>
+        <a:xfrm>
+          <a:off x="0" y="0"/>
+          <a:ext cx="0" cy="0"/>
+          <a:chOff x="0" y="0"/>
+          <a:chExt cx="0" cy="0"/>
+        </a:xfrm>
+      </p:grpSpPr>
+      <p:sp>
+        <p:nvSpPr>
+          <p:cNvPr id="2" name="Title 1"/>
+          <p:cNvSpPr>
+            <a:spLocks noGrp="1"/>
+          </p:cNvSpPr>
+          <p:nvPr>
+            <p:ph type="title"/>
+          </p:nvPr>
+        </p:nvSpPr>
+        <p:spPr/>
+        <p:txBody>
+          <a:bodyPr/>
+          <a:lstStyle/>
+          <a:p>
+            <a:r>
+              <a:rPr lang="en-AU" dirty="0" smtClean="0"/>
+              <a:t>Tonight’s event sponsored by:</a:t>
+            </a:r>
+            <a:endParaRPr lang="en-AU" dirty="0"/>
+          </a:p>
+        </p:txBody>
+      </p:sp>
+      <p:sp>
+        <p:nvSpPr>
+          <p:cNvPr id="4" name="AutoShape 2" descr="https://sp.readifycloud.com/Marketing/Marketing%20Logos%20and%20Images/Readify%20Logo/Legacy%20Readify%20Logos/logo_796x474px.png"/>
+          <p:cNvSpPr>
+            <a:spLocks noChangeAspect="1" noChangeArrowheads="1"/>
+          </p:cNvSpPr>
+          <p:nvPr/>
+        </p:nvSpPr>
+        <p:spPr bwMode="auto">
+          <a:xfrm>
+            <a:off x="155575" y="-144463"/>
+            <a:ext cx="304800" cy="304801"/>
+          </a:xfrm>
+          <a:prstGeom prst="rect">
+            <a:avLst/>
+          </a:prstGeom>
+          <a:noFill/>
+          <a:extLst>
+            <a:ext uri="{909E8E84-426E-40DD-AFC4-6F175D3DCCD1}">
+              <a14:hiddenFill xmlns:a14="http://schemas.microsoft.com/office/drawing/2010/main">
+                <a:solidFill>
+                  <a:srgbClr val="FFFFFF"/>
+                </a:solidFill>
+              </a14:hiddenFill>
+            </a:ext>
+          </a:extLst>
+        </p:spPr>
+        <p:txBody>
+          <a:bodyPr vert="horz" wrap="square" lIns="91440" tIns="45720" rIns="91440" bIns="45720" numCol="1" anchor="t" anchorCtr="0" compatLnSpc="1">
+            <a:prstTxWarp prst="textNoShape">
+              <a:avLst/>
+            </a:prstTxWarp>
+          </a:bodyPr>
+          <a:lstStyle/>
+          <a:p>
+            <a:endParaRPr lang="en-AU"/>
+          </a:p>
+        </p:txBody>
+      </p:sp>
+      <p:pic>
+        <p:nvPicPr>
+          <p:cNvPr id="5" name="Picture 4"/>
+          <p:cNvPicPr>
+            <a:picLocks noChangeAspect="1"/>
+          </p:cNvPicPr>
+          <p:nvPr/>
+        </p:nvPicPr>
+        <p:blipFill>
+          <a:blip r:embed="rId2">
+            <a:extLst>
+              <a:ext uri="{28A0092B-C50C-407E-A947-70E740481C1C}">
+                <a14:useLocalDpi xmlns:a14="http://schemas.microsoft.com/office/drawing/2010/main" val="0"/>
+              </a:ext>
+            </a:extLst>
+          </a:blip>
+          <a:stretch>
+            <a:fillRect/>
+          </a:stretch>
+        </p:blipFill>
+        <p:spPr>
+          <a:xfrm>
+            <a:off x="3548603" y="1496795"/>
+            <a:ext cx="4797729" cy="2856939"/>
+          </a:xfrm>
+          <a:prstGeom prst="rect">
+            <a:avLst/>
+          </a:prstGeom>
+        </p:spPr>
+      </p:pic>
+      <p:sp>
+        <p:nvSpPr>
+          <p:cNvPr id="7" name="TextBox 6"/>
+          <p:cNvSpPr txBox="1"/>
+          <p:nvPr/>
+        </p:nvSpPr>
+        <p:spPr>
+          <a:xfrm>
+            <a:off x="2878410" y="4923145"/>
+            <a:ext cx="6430415" cy="443198"/>
+          </a:xfrm>
+          <a:prstGeom prst="rect">
+            <a:avLst/>
+          </a:prstGeom>
+          <a:noFill/>
+        </p:spPr>
+        <p:txBody>
+          <a:bodyPr wrap="none" lIns="0" tIns="0" rIns="0" bIns="0" rtlCol="0">
+            <a:spAutoFit/>
+          </a:bodyPr>
+          <a:lstStyle/>
+          <a:p>
+            <a:pPr>
+              <a:lnSpc>
+                <a:spcPct val="90000"/>
+              </a:lnSpc>
+              <a:spcBef>
+                <a:spcPct val="20000"/>
+              </a:spcBef>
+              <a:buSzPct val="80000"/>
+            </a:pPr>
+            <a:r>
+              <a:rPr lang="en-AU" sz="3200" dirty="0" smtClean="0"/>
+              <a:t>application development specialists</a:t>
+            </a:r>
+            <a:endParaRPr lang="en-AU" sz="3200" dirty="0"/>
+          </a:p>
+        </p:txBody>
+      </p:sp>
+    </p:spTree>
+    <p:extLst>
+      <p:ext uri="{BB962C8B-B14F-4D97-AF65-F5344CB8AC3E}">
+        <p14:creationId xmlns:p14="http://schemas.microsoft.com/office/powerpoint/2010/main" val="3122680781"/>
+      </p:ext>
+    </p:extLst>
+  </p:cSld>
+  <p:clrMapOvr>
+    <a:masterClrMapping/>
+  </p:clrMapOvr>
+  <p:transition>
+    <p:fade/>
+  </p:transition>
+  <p:timing>
+    <p:tnLst>
+      <p:par>
+        <p:cTn id="1" dur="indefinite" restart="never" nodeType="tmRoot"/>
+      </p:par>
+    </p:tnLst>
+  </p:timing>
+</p:sld>
+</file>
+
+<file path=ppt/slides/slide20.xml><?xml version="1.0" encoding="utf-8"?>
 <p:sld xmlns:a="http://schemas.openxmlformats.org/drawingml/2006/main" xmlns:r="http://schemas.openxmlformats.org/officeDocument/2006/relationships" xmlns:p="http://schemas.openxmlformats.org/presentationml/2006/main">
   <p:cSld>
     <p:spTree>
@@ -24142,7 +24387,908 @@
 </p:sld>
 </file>
 
-<file path=ppt/slides/slide2.xml><?xml version="1.0" encoding="utf-8"?>
+<file path=ppt/slides/slide21.xml><?xml version="1.0" encoding="utf-8"?>
+<p:sld xmlns:a="http://schemas.openxmlformats.org/drawingml/2006/main" xmlns:r="http://schemas.openxmlformats.org/officeDocument/2006/relationships" xmlns:p="http://schemas.openxmlformats.org/presentationml/2006/main">
+  <p:cSld>
+    <p:spTree>
+      <p:nvGrpSpPr>
+        <p:cNvPr id="1" name=""/>
+        <p:cNvGrpSpPr/>
+        <p:nvPr/>
+      </p:nvGrpSpPr>
+      <p:grpSpPr>
+        <a:xfrm>
+          <a:off x="0" y="0"/>
+          <a:ext cx="0" cy="0"/>
+          <a:chOff x="0" y="0"/>
+          <a:chExt cx="0" cy="0"/>
+        </a:xfrm>
+      </p:grpSpPr>
+      <p:sp>
+        <p:nvSpPr>
+          <p:cNvPr id="2" name="Title 1"/>
+          <p:cNvSpPr>
+            <a:spLocks noGrp="1"/>
+          </p:cNvSpPr>
+          <p:nvPr>
+            <p:ph type="title"/>
+          </p:nvPr>
+        </p:nvSpPr>
+        <p:spPr/>
+        <p:txBody>
+          <a:bodyPr/>
+          <a:lstStyle/>
+          <a:p>
+            <a:r>
+              <a:rPr lang="en-AU" dirty="0" smtClean="0"/>
+              <a:t>Backups</a:t>
+            </a:r>
+            <a:endParaRPr lang="en-AU" dirty="0"/>
+          </a:p>
+        </p:txBody>
+      </p:sp>
+      <p:sp>
+        <p:nvSpPr>
+          <p:cNvPr id="3" name="Text Placeholder 2"/>
+          <p:cNvSpPr>
+            <a:spLocks noGrp="1"/>
+          </p:cNvSpPr>
+          <p:nvPr>
+            <p:ph type="body" sz="quarter" idx="10"/>
+          </p:nvPr>
+        </p:nvSpPr>
+        <p:spPr>
+          <a:xfrm>
+            <a:off x="519112" y="1447799"/>
+            <a:ext cx="11149013" cy="2562240"/>
+          </a:xfrm>
+        </p:spPr>
+        <p:txBody>
+          <a:bodyPr/>
+          <a:lstStyle/>
+          <a:p>
+            <a:r>
+              <a:rPr lang="en-AU" dirty="0" err="1" smtClean="0"/>
+              <a:t>Todo</a:t>
+            </a:r>
+            <a:endParaRPr lang="en-AU" dirty="0" smtClean="0"/>
+          </a:p>
+          <a:p>
+            <a:r>
+              <a:rPr lang="en-AU" dirty="0"/>
+              <a:t>	</a:t>
+            </a:r>
+            <a:r>
+              <a:rPr lang="en-AU" dirty="0" smtClean="0"/>
+              <a:t>third party tools</a:t>
+            </a:r>
+          </a:p>
+          <a:p>
+            <a:r>
+              <a:rPr lang="en-AU" dirty="0"/>
+              <a:t>	</a:t>
+            </a:r>
+            <a:r>
+              <a:rPr lang="en-AU" dirty="0" err="1" smtClean="0"/>
+              <a:t>bcp</a:t>
+            </a:r>
+            <a:r>
+              <a:rPr lang="en-AU" dirty="0" smtClean="0"/>
+              <a:t> (not transactionally consistent)</a:t>
+            </a:r>
+          </a:p>
+          <a:p>
+            <a:r>
+              <a:rPr lang="en-AU" dirty="0"/>
+              <a:t>	</a:t>
+            </a:r>
+            <a:r>
+              <a:rPr lang="en-AU" dirty="0" smtClean="0"/>
+              <a:t>create </a:t>
+            </a:r>
+            <a:r>
+              <a:rPr lang="en-AU" dirty="0" err="1" smtClean="0"/>
+              <a:t>gatabase</a:t>
+            </a:r>
+            <a:r>
+              <a:rPr lang="en-AU" dirty="0" smtClean="0"/>
+              <a:t> as copy (charges a whole day)</a:t>
+            </a:r>
+          </a:p>
+        </p:txBody>
+      </p:sp>
+    </p:spTree>
+    <p:extLst>
+      <p:ext uri="{BB962C8B-B14F-4D97-AF65-F5344CB8AC3E}">
+        <p14:creationId xmlns:p14="http://schemas.microsoft.com/office/powerpoint/2010/main" val="1164452152"/>
+      </p:ext>
+    </p:extLst>
+  </p:cSld>
+  <p:clrMapOvr>
+    <a:masterClrMapping/>
+  </p:clrMapOvr>
+  <p:transition>
+    <p:fade/>
+  </p:transition>
+</p:sld>
+</file>
+
+<file path=ppt/slides/slide22.xml><?xml version="1.0" encoding="utf-8"?>
+<p:sld xmlns:a="http://schemas.openxmlformats.org/drawingml/2006/main" xmlns:r="http://schemas.openxmlformats.org/officeDocument/2006/relationships" xmlns:p="http://schemas.openxmlformats.org/presentationml/2006/main">
+  <p:cSld>
+    <p:spTree>
+      <p:nvGrpSpPr>
+        <p:cNvPr id="1" name=""/>
+        <p:cNvGrpSpPr/>
+        <p:nvPr/>
+      </p:nvGrpSpPr>
+      <p:grpSpPr>
+        <a:xfrm>
+          <a:off x="0" y="0"/>
+          <a:ext cx="0" cy="0"/>
+          <a:chOff x="0" y="0"/>
+          <a:chExt cx="0" cy="0"/>
+        </a:xfrm>
+      </p:grpSpPr>
+      <p:sp>
+        <p:nvSpPr>
+          <p:cNvPr id="2" name="Title 1"/>
+          <p:cNvSpPr>
+            <a:spLocks noGrp="1"/>
+          </p:cNvSpPr>
+          <p:nvPr>
+            <p:ph type="title"/>
+          </p:nvPr>
+        </p:nvSpPr>
+        <p:spPr/>
+        <p:txBody>
+          <a:bodyPr/>
+          <a:lstStyle/>
+          <a:p>
+            <a:r>
+              <a:rPr lang="en-AU" dirty="0" smtClean="0"/>
+              <a:t>Schema Management</a:t>
+            </a:r>
+            <a:endParaRPr lang="en-AU" dirty="0"/>
+          </a:p>
+        </p:txBody>
+      </p:sp>
+      <p:sp>
+        <p:nvSpPr>
+          <p:cNvPr id="3" name="Text Placeholder 2"/>
+          <p:cNvSpPr>
+            <a:spLocks noGrp="1"/>
+          </p:cNvSpPr>
+          <p:nvPr>
+            <p:ph type="body" sz="quarter" idx="10"/>
+          </p:nvPr>
+        </p:nvSpPr>
+        <p:spPr>
+          <a:xfrm>
+            <a:off x="519112" y="1447799"/>
+            <a:ext cx="11149013" cy="2885405"/>
+          </a:xfrm>
+        </p:spPr>
+        <p:txBody>
+          <a:bodyPr/>
+          <a:lstStyle/>
+          <a:p>
+            <a:r>
+              <a:rPr lang="en-AU" dirty="0" err="1" smtClean="0"/>
+              <a:t>todo</a:t>
+            </a:r>
+            <a:endParaRPr lang="en-AU" dirty="0" smtClean="0"/>
+          </a:p>
+          <a:p>
+            <a:r>
+              <a:rPr lang="en-AU" dirty="0" smtClean="0"/>
+              <a:t>Use migrations so you get the usual benefits of that, but also helps avoid connecting directly to the database (helps with risk of having less regular </a:t>
+            </a:r>
+            <a:r>
+              <a:rPr lang="en-AU" dirty="0" err="1" smtClean="0"/>
+              <a:t>db</a:t>
+            </a:r>
+            <a:r>
+              <a:rPr lang="en-AU" dirty="0" smtClean="0"/>
+              <a:t> backups and no transaction logs)</a:t>
+            </a:r>
+            <a:endParaRPr lang="en-AU" dirty="0"/>
+          </a:p>
+        </p:txBody>
+      </p:sp>
+    </p:spTree>
+    <p:extLst>
+      <p:ext uri="{BB962C8B-B14F-4D97-AF65-F5344CB8AC3E}">
+        <p14:creationId xmlns:p14="http://schemas.microsoft.com/office/powerpoint/2010/main" val="981396761"/>
+      </p:ext>
+    </p:extLst>
+  </p:cSld>
+  <p:clrMapOvr>
+    <a:masterClrMapping/>
+  </p:clrMapOvr>
+  <p:transition>
+    <p:fade/>
+  </p:transition>
+</p:sld>
+</file>
+
+<file path=ppt/slides/slide23.xml><?xml version="1.0" encoding="utf-8"?>
+<p:sld xmlns:a="http://schemas.openxmlformats.org/drawingml/2006/main" xmlns:r="http://schemas.openxmlformats.org/officeDocument/2006/relationships" xmlns:p="http://schemas.openxmlformats.org/presentationml/2006/main">
+  <p:cSld>
+    <p:spTree>
+      <p:nvGrpSpPr>
+        <p:cNvPr id="1" name=""/>
+        <p:cNvGrpSpPr/>
+        <p:nvPr/>
+      </p:nvGrpSpPr>
+      <p:grpSpPr>
+        <a:xfrm>
+          <a:off x="0" y="0"/>
+          <a:ext cx="0" cy="0"/>
+          <a:chOff x="0" y="0"/>
+          <a:chExt cx="0" cy="0"/>
+        </a:xfrm>
+      </p:grpSpPr>
+      <p:sp>
+        <p:nvSpPr>
+          <p:cNvPr id="2" name="Title 1"/>
+          <p:cNvSpPr>
+            <a:spLocks noGrp="1"/>
+          </p:cNvSpPr>
+          <p:nvPr>
+            <p:ph type="title"/>
+          </p:nvPr>
+        </p:nvSpPr>
+        <p:spPr/>
+        <p:txBody>
+          <a:bodyPr/>
+          <a:lstStyle/>
+          <a:p>
+            <a:r>
+              <a:rPr lang="en-AU" dirty="0" smtClean="0"/>
+              <a:t>Security</a:t>
+            </a:r>
+            <a:endParaRPr lang="en-AU" dirty="0"/>
+          </a:p>
+        </p:txBody>
+      </p:sp>
+      <p:sp>
+        <p:nvSpPr>
+          <p:cNvPr id="3" name="Text Placeholder 2"/>
+          <p:cNvSpPr>
+            <a:spLocks noGrp="1"/>
+          </p:cNvSpPr>
+          <p:nvPr>
+            <p:ph type="body" sz="quarter" idx="10"/>
+          </p:nvPr>
+        </p:nvSpPr>
+        <p:spPr>
+          <a:xfrm>
+            <a:off x="519112" y="1447799"/>
+            <a:ext cx="11149013" cy="4455066"/>
+          </a:xfrm>
+        </p:spPr>
+        <p:txBody>
+          <a:bodyPr/>
+          <a:lstStyle/>
+          <a:p>
+            <a:r>
+              <a:rPr lang="en-AU" dirty="0" err="1" smtClean="0"/>
+              <a:t>Todo</a:t>
+            </a:r>
+            <a:endParaRPr lang="en-AU" dirty="0" smtClean="0"/>
+          </a:p>
+          <a:p>
+            <a:r>
+              <a:rPr lang="en-AU" dirty="0" smtClean="0"/>
+              <a:t>Firewall</a:t>
+            </a:r>
+          </a:p>
+          <a:p>
+            <a:r>
+              <a:rPr lang="en-AU" dirty="0" smtClean="0"/>
+              <a:t>User accounts with privileges</a:t>
+            </a:r>
+          </a:p>
+          <a:p>
+            <a:r>
+              <a:rPr lang="en-AU" dirty="0"/>
+              <a:t>	</a:t>
+            </a:r>
+            <a:r>
+              <a:rPr lang="en-AU" dirty="0" smtClean="0"/>
+              <a:t>server admin </a:t>
+            </a:r>
+            <a:r>
+              <a:rPr lang="en-AU" dirty="0" err="1" smtClean="0"/>
+              <a:t>vs</a:t>
+            </a:r>
+            <a:r>
+              <a:rPr lang="en-AU" dirty="0" smtClean="0"/>
+              <a:t> other</a:t>
+            </a:r>
+          </a:p>
+          <a:p>
+            <a:r>
+              <a:rPr lang="en-AU" dirty="0" smtClean="0"/>
+              <a:t>Encrypt on connection string</a:t>
+            </a:r>
+          </a:p>
+          <a:p>
+            <a:r>
+              <a:rPr lang="en-AU" dirty="0" smtClean="0"/>
+              <a:t>Encrypted </a:t>
+            </a:r>
+            <a:r>
+              <a:rPr lang="en-AU" dirty="0" err="1" smtClean="0"/>
+              <a:t>config</a:t>
+            </a:r>
+            <a:r>
+              <a:rPr lang="en-AU" dirty="0" smtClean="0"/>
+              <a:t> when deploying / password safe for password</a:t>
+            </a:r>
+          </a:p>
+        </p:txBody>
+      </p:sp>
+    </p:spTree>
+    <p:extLst>
+      <p:ext uri="{BB962C8B-B14F-4D97-AF65-F5344CB8AC3E}">
+        <p14:creationId xmlns:p14="http://schemas.microsoft.com/office/powerpoint/2010/main" val="3484700856"/>
+      </p:ext>
+    </p:extLst>
+  </p:cSld>
+  <p:clrMapOvr>
+    <a:masterClrMapping/>
+  </p:clrMapOvr>
+  <p:transition>
+    <p:fade/>
+  </p:transition>
+</p:sld>
+</file>
+
+<file path=ppt/slides/slide24.xml><?xml version="1.0" encoding="utf-8"?>
+<p:sld xmlns:a="http://schemas.openxmlformats.org/drawingml/2006/main" xmlns:r="http://schemas.openxmlformats.org/officeDocument/2006/relationships" xmlns:p="http://schemas.openxmlformats.org/presentationml/2006/main">
+  <p:cSld>
+    <p:spTree>
+      <p:nvGrpSpPr>
+        <p:cNvPr id="1" name=""/>
+        <p:cNvGrpSpPr/>
+        <p:nvPr/>
+      </p:nvGrpSpPr>
+      <p:grpSpPr>
+        <a:xfrm>
+          <a:off x="0" y="0"/>
+          <a:ext cx="0" cy="0"/>
+          <a:chOff x="0" y="0"/>
+          <a:chExt cx="0" cy="0"/>
+        </a:xfrm>
+      </p:grpSpPr>
+      <p:sp>
+        <p:nvSpPr>
+          <p:cNvPr id="2" name="Title 1"/>
+          <p:cNvSpPr>
+            <a:spLocks noGrp="1"/>
+          </p:cNvSpPr>
+          <p:nvPr>
+            <p:ph type="title"/>
+          </p:nvPr>
+        </p:nvSpPr>
+        <p:spPr/>
+        <p:txBody>
+          <a:bodyPr/>
+          <a:lstStyle/>
+          <a:p>
+            <a:r>
+              <a:rPr lang="en-AU" dirty="0" smtClean="0"/>
+              <a:t>Scaling</a:t>
+            </a:r>
+            <a:endParaRPr lang="en-AU" dirty="0"/>
+          </a:p>
+        </p:txBody>
+      </p:sp>
+      <p:sp>
+        <p:nvSpPr>
+          <p:cNvPr id="3" name="Text Placeholder 2"/>
+          <p:cNvSpPr>
+            <a:spLocks noGrp="1"/>
+          </p:cNvSpPr>
+          <p:nvPr>
+            <p:ph type="body" sz="quarter" idx="10"/>
+          </p:nvPr>
+        </p:nvSpPr>
+        <p:spPr>
+          <a:xfrm>
+            <a:off x="519112" y="1447799"/>
+            <a:ext cx="11149013" cy="5678478"/>
+          </a:xfrm>
+        </p:spPr>
+        <p:txBody>
+          <a:bodyPr/>
+          <a:lstStyle/>
+          <a:p>
+            <a:r>
+              <a:rPr lang="en-AU" dirty="0" err="1" smtClean="0"/>
+              <a:t>todo</a:t>
+            </a:r>
+            <a:endParaRPr lang="en-AU" dirty="0" smtClean="0"/>
+          </a:p>
+          <a:p>
+            <a:r>
+              <a:rPr lang="en-AU" dirty="0" smtClean="0"/>
+              <a:t>Vertical (size) =&gt; multi-tenancy for cost cutting</a:t>
+            </a:r>
+          </a:p>
+          <a:p>
+            <a:r>
+              <a:rPr lang="en-AU" dirty="0" smtClean="0"/>
+              <a:t>Horizontal (size and throughput) =&gt; federations or manual</a:t>
+            </a:r>
+          </a:p>
+          <a:p>
+            <a:r>
+              <a:rPr lang="en-AU" dirty="0" smtClean="0"/>
+              <a:t>If you need more size or throughput than SQL Database can handle:</a:t>
+            </a:r>
+          </a:p>
+          <a:p>
+            <a:pPr marL="574675" indent="-571500">
+              <a:buFont typeface="Arial" panose="020B0604020202020204" pitchFamily="34" charset="0"/>
+              <a:buChar char="•"/>
+            </a:pPr>
+            <a:r>
+              <a:rPr lang="en-AU" dirty="0" smtClean="0"/>
+              <a:t>Azure Table Storage (or hybrid between two)</a:t>
+            </a:r>
+          </a:p>
+          <a:p>
+            <a:pPr marL="574675" indent="-571500">
+              <a:buFont typeface="Arial" panose="020B0604020202020204" pitchFamily="34" charset="0"/>
+              <a:buChar char="•"/>
+            </a:pPr>
+            <a:r>
+              <a:rPr lang="en-AU" dirty="0" err="1" smtClean="0"/>
+              <a:t>IaaS</a:t>
+            </a:r>
+            <a:r>
+              <a:rPr lang="en-AU" dirty="0" smtClean="0"/>
+              <a:t> VM with SQL server</a:t>
+            </a:r>
+          </a:p>
+          <a:p>
+            <a:endParaRPr lang="en-AU" dirty="0" smtClean="0"/>
+          </a:p>
+        </p:txBody>
+      </p:sp>
+    </p:spTree>
+    <p:extLst>
+      <p:ext uri="{BB962C8B-B14F-4D97-AF65-F5344CB8AC3E}">
+        <p14:creationId xmlns:p14="http://schemas.microsoft.com/office/powerpoint/2010/main" val="2631833830"/>
+      </p:ext>
+    </p:extLst>
+  </p:cSld>
+  <p:clrMapOvr>
+    <a:masterClrMapping/>
+  </p:clrMapOvr>
+  <p:transition>
+    <p:fade/>
+  </p:transition>
+</p:sld>
+</file>
+
+<file path=ppt/slides/slide25.xml><?xml version="1.0" encoding="utf-8"?>
+<p:sld xmlns:a="http://schemas.openxmlformats.org/drawingml/2006/main" xmlns:r="http://schemas.openxmlformats.org/officeDocument/2006/relationships" xmlns:p="http://schemas.openxmlformats.org/presentationml/2006/main">
+  <p:cSld>
+    <p:spTree>
+      <p:nvGrpSpPr>
+        <p:cNvPr id="1" name=""/>
+        <p:cNvGrpSpPr/>
+        <p:nvPr/>
+      </p:nvGrpSpPr>
+      <p:grpSpPr>
+        <a:xfrm>
+          <a:off x="0" y="0"/>
+          <a:ext cx="0" cy="0"/>
+          <a:chOff x="0" y="0"/>
+          <a:chExt cx="0" cy="0"/>
+        </a:xfrm>
+      </p:grpSpPr>
+      <p:sp>
+        <p:nvSpPr>
+          <p:cNvPr id="3" name="Text Placeholder 2"/>
+          <p:cNvSpPr>
+            <a:spLocks noGrp="1"/>
+          </p:cNvSpPr>
+          <p:nvPr>
+            <p:ph type="body" sz="quarter" idx="10"/>
+          </p:nvPr>
+        </p:nvSpPr>
+        <p:spPr>
+          <a:xfrm>
+            <a:off x="521208" y="2397746"/>
+            <a:ext cx="10693401" cy="1378644"/>
+          </a:xfrm>
+        </p:spPr>
+        <p:txBody>
+          <a:bodyPr/>
+          <a:lstStyle/>
+          <a:p>
+            <a:r>
+              <a:rPr lang="en-US" dirty="0" smtClean="0"/>
+              <a:t>Transient Fault Handling</a:t>
+            </a:r>
+            <a:endParaRPr lang="en-US" dirty="0"/>
+          </a:p>
+        </p:txBody>
+      </p:sp>
+    </p:spTree>
+    <p:extLst>
+      <p:ext uri="{BB962C8B-B14F-4D97-AF65-F5344CB8AC3E}">
+        <p14:creationId xmlns:p14="http://schemas.microsoft.com/office/powerpoint/2010/main" val="3715508783"/>
+      </p:ext>
+    </p:extLst>
+  </p:cSld>
+  <p:clrMapOvr>
+    <a:masterClrMapping/>
+  </p:clrMapOvr>
+  <p:transition>
+    <p:fade/>
+  </p:transition>
+  <p:timing>
+    <p:tnLst>
+      <p:par>
+        <p:cTn id="1" dur="indefinite" restart="never" nodeType="tmRoot"/>
+      </p:par>
+    </p:tnLst>
+  </p:timing>
+</p:sld>
+</file>
+
+<file path=ppt/slides/slide26.xml><?xml version="1.0" encoding="utf-8"?>
+<p:sld xmlns:a="http://schemas.openxmlformats.org/drawingml/2006/main" xmlns:r="http://schemas.openxmlformats.org/officeDocument/2006/relationships" xmlns:p="http://schemas.openxmlformats.org/presentationml/2006/main">
+  <p:cSld>
+    <p:spTree>
+      <p:nvGrpSpPr>
+        <p:cNvPr id="1" name=""/>
+        <p:cNvGrpSpPr/>
+        <p:nvPr/>
+      </p:nvGrpSpPr>
+      <p:grpSpPr>
+        <a:xfrm>
+          <a:off x="0" y="0"/>
+          <a:ext cx="0" cy="0"/>
+          <a:chOff x="0" y="0"/>
+          <a:chExt cx="0" cy="0"/>
+        </a:xfrm>
+      </p:grpSpPr>
+      <p:sp>
+        <p:nvSpPr>
+          <p:cNvPr id="2" name="Title 1"/>
+          <p:cNvSpPr>
+            <a:spLocks noGrp="1"/>
+          </p:cNvSpPr>
+          <p:nvPr>
+            <p:ph type="title"/>
+          </p:nvPr>
+        </p:nvSpPr>
+        <p:spPr/>
+        <p:txBody>
+          <a:bodyPr/>
+          <a:lstStyle/>
+          <a:p>
+            <a:r>
+              <a:rPr lang="en-AU" dirty="0" smtClean="0"/>
+              <a:t>What are transient faults?</a:t>
+            </a:r>
+            <a:endParaRPr lang="en-AU" dirty="0"/>
+          </a:p>
+        </p:txBody>
+      </p:sp>
+      <p:sp>
+        <p:nvSpPr>
+          <p:cNvPr id="3" name="Text Placeholder 2"/>
+          <p:cNvSpPr>
+            <a:spLocks noGrp="1"/>
+          </p:cNvSpPr>
+          <p:nvPr>
+            <p:ph type="body" sz="quarter" idx="10"/>
+          </p:nvPr>
+        </p:nvSpPr>
+        <p:spPr>
+          <a:xfrm>
+            <a:off x="519112" y="1447799"/>
+            <a:ext cx="11149013" cy="553998"/>
+          </a:xfrm>
+        </p:spPr>
+        <p:txBody>
+          <a:bodyPr/>
+          <a:lstStyle/>
+          <a:p>
+            <a:r>
+              <a:rPr lang="en-AU" dirty="0" err="1" smtClean="0"/>
+              <a:t>todo</a:t>
+            </a:r>
+            <a:endParaRPr lang="en-AU" dirty="0"/>
+          </a:p>
+        </p:txBody>
+      </p:sp>
+    </p:spTree>
+    <p:extLst>
+      <p:ext uri="{BB962C8B-B14F-4D97-AF65-F5344CB8AC3E}">
+        <p14:creationId xmlns:p14="http://schemas.microsoft.com/office/powerpoint/2010/main" val="650531519"/>
+      </p:ext>
+    </p:extLst>
+  </p:cSld>
+  <p:clrMapOvr>
+    <a:masterClrMapping/>
+  </p:clrMapOvr>
+  <p:transition>
+    <p:fade/>
+  </p:transition>
+</p:sld>
+</file>
+
+<file path=ppt/slides/slide27.xml><?xml version="1.0" encoding="utf-8"?>
+<p:sld xmlns:a="http://schemas.openxmlformats.org/drawingml/2006/main" xmlns:r="http://schemas.openxmlformats.org/officeDocument/2006/relationships" xmlns:p="http://schemas.openxmlformats.org/presentationml/2006/main">
+  <p:cSld>
+    <p:spTree>
+      <p:nvGrpSpPr>
+        <p:cNvPr id="1" name=""/>
+        <p:cNvGrpSpPr/>
+        <p:nvPr/>
+      </p:nvGrpSpPr>
+      <p:grpSpPr>
+        <a:xfrm>
+          <a:off x="0" y="0"/>
+          <a:ext cx="0" cy="0"/>
+          <a:chOff x="0" y="0"/>
+          <a:chExt cx="0" cy="0"/>
+        </a:xfrm>
+      </p:grpSpPr>
+      <p:sp>
+        <p:nvSpPr>
+          <p:cNvPr id="2" name="Title 1"/>
+          <p:cNvSpPr>
+            <a:spLocks noGrp="1"/>
+          </p:cNvSpPr>
+          <p:nvPr>
+            <p:ph type="title"/>
+          </p:nvPr>
+        </p:nvSpPr>
+        <p:spPr>
+          <a:xfrm>
+            <a:off x="519112" y="228600"/>
+            <a:ext cx="11149013" cy="747897"/>
+          </a:xfrm>
+        </p:spPr>
+        <p:txBody>
+          <a:bodyPr/>
+          <a:lstStyle/>
+          <a:p>
+            <a:r>
+              <a:rPr lang="en-AU" dirty="0" smtClean="0"/>
+              <a:t>Why does it give transient faults?</a:t>
+            </a:r>
+            <a:endParaRPr lang="en-AU" dirty="0"/>
+          </a:p>
+        </p:txBody>
+      </p:sp>
+      <p:sp>
+        <p:nvSpPr>
+          <p:cNvPr id="3" name="Text Placeholder 2"/>
+          <p:cNvSpPr>
+            <a:spLocks noGrp="1"/>
+          </p:cNvSpPr>
+          <p:nvPr>
+            <p:ph type="body" sz="quarter" idx="10"/>
+          </p:nvPr>
+        </p:nvSpPr>
+        <p:spPr>
+          <a:xfrm>
+            <a:off x="519112" y="1447799"/>
+            <a:ext cx="11149013" cy="553998"/>
+          </a:xfrm>
+        </p:spPr>
+        <p:txBody>
+          <a:bodyPr/>
+          <a:lstStyle/>
+          <a:p>
+            <a:r>
+              <a:rPr lang="en-AU" dirty="0" err="1" smtClean="0"/>
+              <a:t>todo</a:t>
+            </a:r>
+            <a:endParaRPr lang="en-AU" dirty="0"/>
+          </a:p>
+        </p:txBody>
+      </p:sp>
+    </p:spTree>
+    <p:extLst>
+      <p:ext uri="{BB962C8B-B14F-4D97-AF65-F5344CB8AC3E}">
+        <p14:creationId xmlns:p14="http://schemas.microsoft.com/office/powerpoint/2010/main" val="437241435"/>
+      </p:ext>
+    </p:extLst>
+  </p:cSld>
+  <p:clrMapOvr>
+    <a:masterClrMapping/>
+  </p:clrMapOvr>
+  <p:transition>
+    <p:fade/>
+  </p:transition>
+</p:sld>
+</file>
+
+<file path=ppt/slides/slide28.xml><?xml version="1.0" encoding="utf-8"?>
+<p:sld xmlns:a="http://schemas.openxmlformats.org/drawingml/2006/main" xmlns:r="http://schemas.openxmlformats.org/officeDocument/2006/relationships" xmlns:p="http://schemas.openxmlformats.org/presentationml/2006/main">
+  <p:cSld>
+    <p:spTree>
+      <p:nvGrpSpPr>
+        <p:cNvPr id="1" name=""/>
+        <p:cNvGrpSpPr/>
+        <p:nvPr/>
+      </p:nvGrpSpPr>
+      <p:grpSpPr>
+        <a:xfrm>
+          <a:off x="0" y="0"/>
+          <a:ext cx="0" cy="0"/>
+          <a:chOff x="0" y="0"/>
+          <a:chExt cx="0" cy="0"/>
+        </a:xfrm>
+      </p:grpSpPr>
+      <p:sp>
+        <p:nvSpPr>
+          <p:cNvPr id="2" name="Title 1"/>
+          <p:cNvSpPr>
+            <a:spLocks noGrp="1"/>
+          </p:cNvSpPr>
+          <p:nvPr>
+            <p:ph type="title"/>
+          </p:nvPr>
+        </p:nvSpPr>
+        <p:spPr/>
+        <p:txBody>
+          <a:bodyPr/>
+          <a:lstStyle/>
+          <a:p>
+            <a:r>
+              <a:rPr lang="en-AU" dirty="0" smtClean="0"/>
+              <a:t>Transient Fault Handling library</a:t>
+            </a:r>
+            <a:endParaRPr lang="en-AU" dirty="0"/>
+          </a:p>
+        </p:txBody>
+      </p:sp>
+      <p:sp>
+        <p:nvSpPr>
+          <p:cNvPr id="3" name="Text Placeholder 2"/>
+          <p:cNvSpPr>
+            <a:spLocks noGrp="1"/>
+          </p:cNvSpPr>
+          <p:nvPr>
+            <p:ph type="body" sz="quarter" idx="10"/>
+          </p:nvPr>
+        </p:nvSpPr>
+        <p:spPr>
+          <a:xfrm>
+            <a:off x="519112" y="1447799"/>
+            <a:ext cx="11149013" cy="553998"/>
+          </a:xfrm>
+        </p:spPr>
+        <p:txBody>
+          <a:bodyPr/>
+          <a:lstStyle/>
+          <a:p>
+            <a:r>
+              <a:rPr lang="en-AU" dirty="0" err="1" smtClean="0"/>
+              <a:t>todo</a:t>
+            </a:r>
+            <a:endParaRPr lang="en-AU" dirty="0"/>
+          </a:p>
+        </p:txBody>
+      </p:sp>
+    </p:spTree>
+    <p:extLst>
+      <p:ext uri="{BB962C8B-B14F-4D97-AF65-F5344CB8AC3E}">
+        <p14:creationId xmlns:p14="http://schemas.microsoft.com/office/powerpoint/2010/main" val="1818265585"/>
+      </p:ext>
+    </p:extLst>
+  </p:cSld>
+  <p:clrMapOvr>
+    <a:masterClrMapping/>
+  </p:clrMapOvr>
+  <p:transition>
+    <p:fade/>
+  </p:transition>
+</p:sld>
+</file>
+
+<file path=ppt/slides/slide29.xml><?xml version="1.0" encoding="utf-8"?>
+<p:sld xmlns:a="http://schemas.openxmlformats.org/drawingml/2006/main" xmlns:r="http://schemas.openxmlformats.org/officeDocument/2006/relationships" xmlns:p="http://schemas.openxmlformats.org/presentationml/2006/main">
+  <p:cSld>
+    <p:spTree>
+      <p:nvGrpSpPr>
+        <p:cNvPr id="1" name=""/>
+        <p:cNvGrpSpPr/>
+        <p:nvPr/>
+      </p:nvGrpSpPr>
+      <p:grpSpPr>
+        <a:xfrm>
+          <a:off x="0" y="0"/>
+          <a:ext cx="0" cy="0"/>
+          <a:chOff x="0" y="0"/>
+          <a:chExt cx="0" cy="0"/>
+        </a:xfrm>
+      </p:grpSpPr>
+      <p:sp>
+        <p:nvSpPr>
+          <p:cNvPr id="2" name="Title 1"/>
+          <p:cNvSpPr>
+            <a:spLocks noGrp="1"/>
+          </p:cNvSpPr>
+          <p:nvPr>
+            <p:ph type="title"/>
+          </p:nvPr>
+        </p:nvSpPr>
+        <p:spPr/>
+        <p:txBody>
+          <a:bodyPr/>
+          <a:lstStyle/>
+          <a:p>
+            <a:r>
+              <a:rPr lang="en-AU" dirty="0" err="1" smtClean="0"/>
+              <a:t>NHibernate.SqlAzure</a:t>
+            </a:r>
+            <a:r>
+              <a:rPr lang="en-AU" dirty="0" smtClean="0"/>
+              <a:t> library</a:t>
+            </a:r>
+            <a:endParaRPr lang="en-AU" dirty="0"/>
+          </a:p>
+        </p:txBody>
+      </p:sp>
+      <p:sp>
+        <p:nvSpPr>
+          <p:cNvPr id="3" name="Text Placeholder 2"/>
+          <p:cNvSpPr>
+            <a:spLocks noGrp="1"/>
+          </p:cNvSpPr>
+          <p:nvPr>
+            <p:ph type="body" sz="quarter" idx="10"/>
+          </p:nvPr>
+        </p:nvSpPr>
+        <p:spPr>
+          <a:xfrm>
+            <a:off x="519112" y="1447799"/>
+            <a:ext cx="11149013" cy="553998"/>
+          </a:xfrm>
+        </p:spPr>
+        <p:txBody>
+          <a:bodyPr/>
+          <a:lstStyle/>
+          <a:p>
+            <a:r>
+              <a:rPr lang="en-AU" dirty="0" err="1" smtClean="0"/>
+              <a:t>todo</a:t>
+            </a:r>
+            <a:endParaRPr lang="en-AU" dirty="0"/>
+          </a:p>
+        </p:txBody>
+      </p:sp>
+    </p:spTree>
+    <p:extLst>
+      <p:ext uri="{BB962C8B-B14F-4D97-AF65-F5344CB8AC3E}">
+        <p14:creationId xmlns:p14="http://schemas.microsoft.com/office/powerpoint/2010/main" val="2969714386"/>
+      </p:ext>
+    </p:extLst>
+  </p:cSld>
+  <p:clrMapOvr>
+    <a:masterClrMapping/>
+  </p:clrMapOvr>
+  <p:transition>
+    <p:fade/>
+  </p:transition>
+</p:sld>
+</file>
+
+<file path=ppt/slides/slide3.xml><?xml version="1.0" encoding="utf-8"?>
 <p:sld xmlns:a="http://schemas.openxmlformats.org/drawingml/2006/main" xmlns:r="http://schemas.openxmlformats.org/officeDocument/2006/relationships" xmlns:p="http://schemas.openxmlformats.org/presentationml/2006/main">
   <p:cSld>
     <p:spTree>
@@ -24314,495 +25460,7 @@
 </p:sld>
 </file>
 
-<file path=ppt/slides/slide20.xml><?xml version="1.0" encoding="utf-8"?>
-<p:sld xmlns:a="http://schemas.openxmlformats.org/drawingml/2006/main" xmlns:r="http://schemas.openxmlformats.org/officeDocument/2006/relationships" xmlns:p="http://schemas.openxmlformats.org/presentationml/2006/main">
-  <p:cSld>
-    <p:spTree>
-      <p:nvGrpSpPr>
-        <p:cNvPr id="1" name=""/>
-        <p:cNvGrpSpPr/>
-        <p:nvPr/>
-      </p:nvGrpSpPr>
-      <p:grpSpPr>
-        <a:xfrm>
-          <a:off x="0" y="0"/>
-          <a:ext cx="0" cy="0"/>
-          <a:chOff x="0" y="0"/>
-          <a:chExt cx="0" cy="0"/>
-        </a:xfrm>
-      </p:grpSpPr>
-      <p:sp>
-        <p:nvSpPr>
-          <p:cNvPr id="2" name="Title 1"/>
-          <p:cNvSpPr>
-            <a:spLocks noGrp="1"/>
-          </p:cNvSpPr>
-          <p:nvPr>
-            <p:ph type="title"/>
-          </p:nvPr>
-        </p:nvSpPr>
-        <p:spPr/>
-        <p:txBody>
-          <a:bodyPr/>
-          <a:lstStyle/>
-          <a:p>
-            <a:r>
-              <a:rPr lang="en-AU" dirty="0" smtClean="0"/>
-              <a:t>Backups</a:t>
-            </a:r>
-            <a:endParaRPr lang="en-AU" dirty="0"/>
-          </a:p>
-        </p:txBody>
-      </p:sp>
-      <p:sp>
-        <p:nvSpPr>
-          <p:cNvPr id="3" name="Text Placeholder 2"/>
-          <p:cNvSpPr>
-            <a:spLocks noGrp="1"/>
-          </p:cNvSpPr>
-          <p:nvPr>
-            <p:ph type="body" sz="quarter" idx="10"/>
-          </p:nvPr>
-        </p:nvSpPr>
-        <p:spPr>
-          <a:xfrm>
-            <a:off x="519112" y="1447799"/>
-            <a:ext cx="11149013" cy="2562240"/>
-          </a:xfrm>
-        </p:spPr>
-        <p:txBody>
-          <a:bodyPr/>
-          <a:lstStyle/>
-          <a:p>
-            <a:r>
-              <a:rPr lang="en-AU" dirty="0" err="1" smtClean="0"/>
-              <a:t>Todo</a:t>
-            </a:r>
-            <a:endParaRPr lang="en-AU" dirty="0" smtClean="0"/>
-          </a:p>
-          <a:p>
-            <a:r>
-              <a:rPr lang="en-AU" dirty="0"/>
-              <a:t>	</a:t>
-            </a:r>
-            <a:r>
-              <a:rPr lang="en-AU" dirty="0" smtClean="0"/>
-              <a:t>third party tools</a:t>
-            </a:r>
-          </a:p>
-          <a:p>
-            <a:r>
-              <a:rPr lang="en-AU" dirty="0"/>
-              <a:t>	</a:t>
-            </a:r>
-            <a:r>
-              <a:rPr lang="en-AU" dirty="0" err="1" smtClean="0"/>
-              <a:t>bcp</a:t>
-            </a:r>
-            <a:r>
-              <a:rPr lang="en-AU" dirty="0" smtClean="0"/>
-              <a:t> (not transactionally consistent)</a:t>
-            </a:r>
-          </a:p>
-          <a:p>
-            <a:r>
-              <a:rPr lang="en-AU" dirty="0"/>
-              <a:t>	</a:t>
-            </a:r>
-            <a:r>
-              <a:rPr lang="en-AU" dirty="0" smtClean="0"/>
-              <a:t>create </a:t>
-            </a:r>
-            <a:r>
-              <a:rPr lang="en-AU" dirty="0" err="1" smtClean="0"/>
-              <a:t>gatabase</a:t>
-            </a:r>
-            <a:r>
-              <a:rPr lang="en-AU" dirty="0" smtClean="0"/>
-              <a:t> as copy (charges a whole day)</a:t>
-            </a:r>
-          </a:p>
-        </p:txBody>
-      </p:sp>
-    </p:spTree>
-    <p:extLst>
-      <p:ext uri="{BB962C8B-B14F-4D97-AF65-F5344CB8AC3E}">
-        <p14:creationId xmlns:p14="http://schemas.microsoft.com/office/powerpoint/2010/main" val="1164452152"/>
-      </p:ext>
-    </p:extLst>
-  </p:cSld>
-  <p:clrMapOvr>
-    <a:masterClrMapping/>
-  </p:clrMapOvr>
-  <p:transition>
-    <p:fade/>
-  </p:transition>
-</p:sld>
-</file>
-
-<file path=ppt/slides/slide21.xml><?xml version="1.0" encoding="utf-8"?>
-<p:sld xmlns:a="http://schemas.openxmlformats.org/drawingml/2006/main" xmlns:r="http://schemas.openxmlformats.org/officeDocument/2006/relationships" xmlns:p="http://schemas.openxmlformats.org/presentationml/2006/main">
-  <p:cSld>
-    <p:spTree>
-      <p:nvGrpSpPr>
-        <p:cNvPr id="1" name=""/>
-        <p:cNvGrpSpPr/>
-        <p:nvPr/>
-      </p:nvGrpSpPr>
-      <p:grpSpPr>
-        <a:xfrm>
-          <a:off x="0" y="0"/>
-          <a:ext cx="0" cy="0"/>
-          <a:chOff x="0" y="0"/>
-          <a:chExt cx="0" cy="0"/>
-        </a:xfrm>
-      </p:grpSpPr>
-      <p:sp>
-        <p:nvSpPr>
-          <p:cNvPr id="2" name="Title 1"/>
-          <p:cNvSpPr>
-            <a:spLocks noGrp="1"/>
-          </p:cNvSpPr>
-          <p:nvPr>
-            <p:ph type="title"/>
-          </p:nvPr>
-        </p:nvSpPr>
-        <p:spPr/>
-        <p:txBody>
-          <a:bodyPr/>
-          <a:lstStyle/>
-          <a:p>
-            <a:r>
-              <a:rPr lang="en-AU" dirty="0" smtClean="0"/>
-              <a:t>Schema Management</a:t>
-            </a:r>
-            <a:endParaRPr lang="en-AU" dirty="0"/>
-          </a:p>
-        </p:txBody>
-      </p:sp>
-      <p:sp>
-        <p:nvSpPr>
-          <p:cNvPr id="3" name="Text Placeholder 2"/>
-          <p:cNvSpPr>
-            <a:spLocks noGrp="1"/>
-          </p:cNvSpPr>
-          <p:nvPr>
-            <p:ph type="body" sz="quarter" idx="10"/>
-          </p:nvPr>
-        </p:nvSpPr>
-        <p:spPr>
-          <a:xfrm>
-            <a:off x="519112" y="1447799"/>
-            <a:ext cx="11149013" cy="2885405"/>
-          </a:xfrm>
-        </p:spPr>
-        <p:txBody>
-          <a:bodyPr/>
-          <a:lstStyle/>
-          <a:p>
-            <a:r>
-              <a:rPr lang="en-AU" dirty="0" err="1" smtClean="0"/>
-              <a:t>todo</a:t>
-            </a:r>
-            <a:endParaRPr lang="en-AU" dirty="0" smtClean="0"/>
-          </a:p>
-          <a:p>
-            <a:r>
-              <a:rPr lang="en-AU" dirty="0" smtClean="0"/>
-              <a:t>Use migrations so you get the usual benefits of that, but also helps avoid connecting directly to the database (helps with risk of having less regular </a:t>
-            </a:r>
-            <a:r>
-              <a:rPr lang="en-AU" dirty="0" err="1" smtClean="0"/>
-              <a:t>db</a:t>
-            </a:r>
-            <a:r>
-              <a:rPr lang="en-AU" dirty="0" smtClean="0"/>
-              <a:t> backups and no transaction logs)</a:t>
-            </a:r>
-            <a:endParaRPr lang="en-AU" dirty="0"/>
-          </a:p>
-        </p:txBody>
-      </p:sp>
-    </p:spTree>
-    <p:extLst>
-      <p:ext uri="{BB962C8B-B14F-4D97-AF65-F5344CB8AC3E}">
-        <p14:creationId xmlns:p14="http://schemas.microsoft.com/office/powerpoint/2010/main" val="981396761"/>
-      </p:ext>
-    </p:extLst>
-  </p:cSld>
-  <p:clrMapOvr>
-    <a:masterClrMapping/>
-  </p:clrMapOvr>
-  <p:transition>
-    <p:fade/>
-  </p:transition>
-</p:sld>
-</file>
-
-<file path=ppt/slides/slide22.xml><?xml version="1.0" encoding="utf-8"?>
-<p:sld xmlns:a="http://schemas.openxmlformats.org/drawingml/2006/main" xmlns:r="http://schemas.openxmlformats.org/officeDocument/2006/relationships" xmlns:p="http://schemas.openxmlformats.org/presentationml/2006/main">
-  <p:cSld>
-    <p:spTree>
-      <p:nvGrpSpPr>
-        <p:cNvPr id="1" name=""/>
-        <p:cNvGrpSpPr/>
-        <p:nvPr/>
-      </p:nvGrpSpPr>
-      <p:grpSpPr>
-        <a:xfrm>
-          <a:off x="0" y="0"/>
-          <a:ext cx="0" cy="0"/>
-          <a:chOff x="0" y="0"/>
-          <a:chExt cx="0" cy="0"/>
-        </a:xfrm>
-      </p:grpSpPr>
-      <p:sp>
-        <p:nvSpPr>
-          <p:cNvPr id="2" name="Title 1"/>
-          <p:cNvSpPr>
-            <a:spLocks noGrp="1"/>
-          </p:cNvSpPr>
-          <p:nvPr>
-            <p:ph type="title"/>
-          </p:nvPr>
-        </p:nvSpPr>
-        <p:spPr/>
-        <p:txBody>
-          <a:bodyPr/>
-          <a:lstStyle/>
-          <a:p>
-            <a:r>
-              <a:rPr lang="en-AU" dirty="0" smtClean="0"/>
-              <a:t>Security</a:t>
-            </a:r>
-            <a:endParaRPr lang="en-AU" dirty="0"/>
-          </a:p>
-        </p:txBody>
-      </p:sp>
-      <p:sp>
-        <p:nvSpPr>
-          <p:cNvPr id="3" name="Text Placeholder 2"/>
-          <p:cNvSpPr>
-            <a:spLocks noGrp="1"/>
-          </p:cNvSpPr>
-          <p:nvPr>
-            <p:ph type="body" sz="quarter" idx="10"/>
-          </p:nvPr>
-        </p:nvSpPr>
-        <p:spPr>
-          <a:xfrm>
-            <a:off x="519112" y="1447799"/>
-            <a:ext cx="11149013" cy="4455066"/>
-          </a:xfrm>
-        </p:spPr>
-        <p:txBody>
-          <a:bodyPr/>
-          <a:lstStyle/>
-          <a:p>
-            <a:r>
-              <a:rPr lang="en-AU" dirty="0" err="1" smtClean="0"/>
-              <a:t>Todo</a:t>
-            </a:r>
-            <a:endParaRPr lang="en-AU" dirty="0" smtClean="0"/>
-          </a:p>
-          <a:p>
-            <a:r>
-              <a:rPr lang="en-AU" dirty="0" smtClean="0"/>
-              <a:t>Firewall</a:t>
-            </a:r>
-          </a:p>
-          <a:p>
-            <a:r>
-              <a:rPr lang="en-AU" dirty="0" smtClean="0"/>
-              <a:t>User accounts with privileges</a:t>
-            </a:r>
-          </a:p>
-          <a:p>
-            <a:r>
-              <a:rPr lang="en-AU" dirty="0"/>
-              <a:t>	</a:t>
-            </a:r>
-            <a:r>
-              <a:rPr lang="en-AU" dirty="0" smtClean="0"/>
-              <a:t>server admin </a:t>
-            </a:r>
-            <a:r>
-              <a:rPr lang="en-AU" dirty="0" err="1" smtClean="0"/>
-              <a:t>vs</a:t>
-            </a:r>
-            <a:r>
-              <a:rPr lang="en-AU" dirty="0" smtClean="0"/>
-              <a:t> other</a:t>
-            </a:r>
-          </a:p>
-          <a:p>
-            <a:r>
-              <a:rPr lang="en-AU" dirty="0" smtClean="0"/>
-              <a:t>Encrypt on connection string</a:t>
-            </a:r>
-          </a:p>
-          <a:p>
-            <a:r>
-              <a:rPr lang="en-AU" dirty="0" smtClean="0"/>
-              <a:t>Encrypted </a:t>
-            </a:r>
-            <a:r>
-              <a:rPr lang="en-AU" dirty="0" err="1" smtClean="0"/>
-              <a:t>config</a:t>
-            </a:r>
-            <a:r>
-              <a:rPr lang="en-AU" dirty="0" smtClean="0"/>
-              <a:t> when deploying / password safe for password</a:t>
-            </a:r>
-          </a:p>
-        </p:txBody>
-      </p:sp>
-    </p:spTree>
-    <p:extLst>
-      <p:ext uri="{BB962C8B-B14F-4D97-AF65-F5344CB8AC3E}">
-        <p14:creationId xmlns:p14="http://schemas.microsoft.com/office/powerpoint/2010/main" val="3484700856"/>
-      </p:ext>
-    </p:extLst>
-  </p:cSld>
-  <p:clrMapOvr>
-    <a:masterClrMapping/>
-  </p:clrMapOvr>
-  <p:transition>
-    <p:fade/>
-  </p:transition>
-</p:sld>
-</file>
-
-<file path=ppt/slides/slide23.xml><?xml version="1.0" encoding="utf-8"?>
-<p:sld xmlns:a="http://schemas.openxmlformats.org/drawingml/2006/main" xmlns:r="http://schemas.openxmlformats.org/officeDocument/2006/relationships" xmlns:p="http://schemas.openxmlformats.org/presentationml/2006/main">
-  <p:cSld>
-    <p:spTree>
-      <p:nvGrpSpPr>
-        <p:cNvPr id="1" name=""/>
-        <p:cNvGrpSpPr/>
-        <p:nvPr/>
-      </p:nvGrpSpPr>
-      <p:grpSpPr>
-        <a:xfrm>
-          <a:off x="0" y="0"/>
-          <a:ext cx="0" cy="0"/>
-          <a:chOff x="0" y="0"/>
-          <a:chExt cx="0" cy="0"/>
-        </a:xfrm>
-      </p:grpSpPr>
-      <p:sp>
-        <p:nvSpPr>
-          <p:cNvPr id="2" name="Title 1"/>
-          <p:cNvSpPr>
-            <a:spLocks noGrp="1"/>
-          </p:cNvSpPr>
-          <p:nvPr>
-            <p:ph type="title"/>
-          </p:nvPr>
-        </p:nvSpPr>
-        <p:spPr/>
-        <p:txBody>
-          <a:bodyPr/>
-          <a:lstStyle/>
-          <a:p>
-            <a:r>
-              <a:rPr lang="en-AU" dirty="0" smtClean="0"/>
-              <a:t>Scaling</a:t>
-            </a:r>
-            <a:endParaRPr lang="en-AU" dirty="0"/>
-          </a:p>
-        </p:txBody>
-      </p:sp>
-      <p:sp>
-        <p:nvSpPr>
-          <p:cNvPr id="3" name="Text Placeholder 2"/>
-          <p:cNvSpPr>
-            <a:spLocks noGrp="1"/>
-          </p:cNvSpPr>
-          <p:nvPr>
-            <p:ph type="body" sz="quarter" idx="10"/>
-          </p:nvPr>
-        </p:nvSpPr>
-        <p:spPr>
-          <a:xfrm>
-            <a:off x="519112" y="1447799"/>
-            <a:ext cx="11149013" cy="5678478"/>
-          </a:xfrm>
-        </p:spPr>
-        <p:txBody>
-          <a:bodyPr/>
-          <a:lstStyle/>
-          <a:p>
-            <a:r>
-              <a:rPr lang="en-AU" dirty="0" err="1" smtClean="0"/>
-              <a:t>todo</a:t>
-            </a:r>
-            <a:endParaRPr lang="en-AU" dirty="0" smtClean="0"/>
-          </a:p>
-          <a:p>
-            <a:r>
-              <a:rPr lang="en-AU" dirty="0" smtClean="0"/>
-              <a:t>Vertical (size) =&gt; multi-tenancy for cost cutting</a:t>
-            </a:r>
-          </a:p>
-          <a:p>
-            <a:r>
-              <a:rPr lang="en-AU" dirty="0" smtClean="0"/>
-              <a:t>Horizontal (size and throughput) =&gt; federations or manual</a:t>
-            </a:r>
-          </a:p>
-          <a:p>
-            <a:r>
-              <a:rPr lang="en-AU" dirty="0" smtClean="0"/>
-              <a:t>If you need more size or throughput than SQL Database can handle:</a:t>
-            </a:r>
-          </a:p>
-          <a:p>
-            <a:pPr marL="574675" indent="-571500">
-              <a:buFont typeface="Arial" panose="020B0604020202020204" pitchFamily="34" charset="0"/>
-              <a:buChar char="•"/>
-            </a:pPr>
-            <a:r>
-              <a:rPr lang="en-AU" dirty="0" smtClean="0"/>
-              <a:t>Azure Table Storage (or hybrid between two)</a:t>
-            </a:r>
-          </a:p>
-          <a:p>
-            <a:pPr marL="574675" indent="-571500">
-              <a:buFont typeface="Arial" panose="020B0604020202020204" pitchFamily="34" charset="0"/>
-              <a:buChar char="•"/>
-            </a:pPr>
-            <a:r>
-              <a:rPr lang="en-AU" dirty="0" err="1" smtClean="0"/>
-              <a:t>IaaS</a:t>
-            </a:r>
-            <a:r>
-              <a:rPr lang="en-AU" dirty="0" smtClean="0"/>
-              <a:t> VM with SQL server</a:t>
-            </a:r>
-          </a:p>
-          <a:p>
-            <a:endParaRPr lang="en-AU" dirty="0" smtClean="0"/>
-          </a:p>
-        </p:txBody>
-      </p:sp>
-    </p:spTree>
-    <p:extLst>
-      <p:ext uri="{BB962C8B-B14F-4D97-AF65-F5344CB8AC3E}">
-        <p14:creationId xmlns:p14="http://schemas.microsoft.com/office/powerpoint/2010/main" val="2631833830"/>
-      </p:ext>
-    </p:extLst>
-  </p:cSld>
-  <p:clrMapOvr>
-    <a:masterClrMapping/>
-  </p:clrMapOvr>
-  <p:transition>
-    <p:fade/>
-  </p:transition>
-</p:sld>
-</file>
-
-<file path=ppt/slides/slide24.xml><?xml version="1.0" encoding="utf-8"?>
+<file path=ppt/slides/slide30.xml><?xml version="1.0" encoding="utf-8"?>
 <p:sld xmlns:a="http://schemas.openxmlformats.org/drawingml/2006/main" xmlns:r="http://schemas.openxmlformats.org/officeDocument/2006/relationships" xmlns:p="http://schemas.openxmlformats.org/presentationml/2006/main">
   <p:cSld>
     <p:spTree>
@@ -24841,7 +25499,7 @@
           <a:p>
             <a:r>
               <a:rPr lang="en-US" dirty="0" smtClean="0"/>
-              <a:t>Transient Fault Handling</a:t>
+              <a:t>When should I use it?</a:t>
             </a:r>
             <a:endParaRPr lang="en-US" dirty="0"/>
           </a:p>
@@ -24850,7 +25508,7 @@
     </p:spTree>
     <p:extLst>
       <p:ext uri="{BB962C8B-B14F-4D97-AF65-F5344CB8AC3E}">
-        <p14:creationId xmlns:p14="http://schemas.microsoft.com/office/powerpoint/2010/main" val="3715508783"/>
+        <p14:creationId xmlns:p14="http://schemas.microsoft.com/office/powerpoint/2010/main" val="2989498135"/>
       </p:ext>
     </p:extLst>
   </p:cSld>
@@ -24870,7 +25528,7 @@
 </p:sld>
 </file>
 
-<file path=ppt/slides/slide25.xml><?xml version="1.0" encoding="utf-8"?>
+<file path=ppt/slides/slide31.xml><?xml version="1.0" encoding="utf-8"?>
 <p:sld xmlns:a="http://schemas.openxmlformats.org/drawingml/2006/main" xmlns:r="http://schemas.openxmlformats.org/officeDocument/2006/relationships" xmlns:p="http://schemas.openxmlformats.org/presentationml/2006/main">
   <p:cSld>
     <p:spTree>
@@ -24904,487 +25562,6 @@
           <a:p>
             <a:r>
               <a:rPr lang="en-AU" dirty="0" smtClean="0"/>
-              <a:t>What are transient faults?</a:t>
-            </a:r>
-            <a:endParaRPr lang="en-AU" dirty="0"/>
-          </a:p>
-        </p:txBody>
-      </p:sp>
-      <p:sp>
-        <p:nvSpPr>
-          <p:cNvPr id="3" name="Text Placeholder 2"/>
-          <p:cNvSpPr>
-            <a:spLocks noGrp="1"/>
-          </p:cNvSpPr>
-          <p:nvPr>
-            <p:ph type="body" sz="quarter" idx="10"/>
-          </p:nvPr>
-        </p:nvSpPr>
-        <p:spPr>
-          <a:xfrm>
-            <a:off x="519112" y="1447799"/>
-            <a:ext cx="11149013" cy="553998"/>
-          </a:xfrm>
-        </p:spPr>
-        <p:txBody>
-          <a:bodyPr/>
-          <a:lstStyle/>
-          <a:p>
-            <a:r>
-              <a:rPr lang="en-AU" dirty="0" err="1" smtClean="0"/>
-              <a:t>todo</a:t>
-            </a:r>
-            <a:endParaRPr lang="en-AU" dirty="0"/>
-          </a:p>
-        </p:txBody>
-      </p:sp>
-    </p:spTree>
-    <p:extLst>
-      <p:ext uri="{BB962C8B-B14F-4D97-AF65-F5344CB8AC3E}">
-        <p14:creationId xmlns:p14="http://schemas.microsoft.com/office/powerpoint/2010/main" val="650531519"/>
-      </p:ext>
-    </p:extLst>
-  </p:cSld>
-  <p:clrMapOvr>
-    <a:masterClrMapping/>
-  </p:clrMapOvr>
-  <p:transition>
-    <p:fade/>
-  </p:transition>
-</p:sld>
-</file>
-
-<file path=ppt/slides/slide26.xml><?xml version="1.0" encoding="utf-8"?>
-<p:sld xmlns:a="http://schemas.openxmlformats.org/drawingml/2006/main" xmlns:r="http://schemas.openxmlformats.org/officeDocument/2006/relationships" xmlns:p="http://schemas.openxmlformats.org/presentationml/2006/main">
-  <p:cSld>
-    <p:spTree>
-      <p:nvGrpSpPr>
-        <p:cNvPr id="1" name=""/>
-        <p:cNvGrpSpPr/>
-        <p:nvPr/>
-      </p:nvGrpSpPr>
-      <p:grpSpPr>
-        <a:xfrm>
-          <a:off x="0" y="0"/>
-          <a:ext cx="0" cy="0"/>
-          <a:chOff x="0" y="0"/>
-          <a:chExt cx="0" cy="0"/>
-        </a:xfrm>
-      </p:grpSpPr>
-      <p:sp>
-        <p:nvSpPr>
-          <p:cNvPr id="2" name="Title 1"/>
-          <p:cNvSpPr>
-            <a:spLocks noGrp="1"/>
-          </p:cNvSpPr>
-          <p:nvPr>
-            <p:ph type="title"/>
-          </p:nvPr>
-        </p:nvSpPr>
-        <p:spPr>
-          <a:xfrm>
-            <a:off x="519112" y="228600"/>
-            <a:ext cx="11149013" cy="747897"/>
-          </a:xfrm>
-        </p:spPr>
-        <p:txBody>
-          <a:bodyPr/>
-          <a:lstStyle/>
-          <a:p>
-            <a:r>
-              <a:rPr lang="en-AU" dirty="0" smtClean="0"/>
-              <a:t>Why does it give transient faults?</a:t>
-            </a:r>
-            <a:endParaRPr lang="en-AU" dirty="0"/>
-          </a:p>
-        </p:txBody>
-      </p:sp>
-      <p:sp>
-        <p:nvSpPr>
-          <p:cNvPr id="3" name="Text Placeholder 2"/>
-          <p:cNvSpPr>
-            <a:spLocks noGrp="1"/>
-          </p:cNvSpPr>
-          <p:nvPr>
-            <p:ph type="body" sz="quarter" idx="10"/>
-          </p:nvPr>
-        </p:nvSpPr>
-        <p:spPr>
-          <a:xfrm>
-            <a:off x="519112" y="1447799"/>
-            <a:ext cx="11149013" cy="553998"/>
-          </a:xfrm>
-        </p:spPr>
-        <p:txBody>
-          <a:bodyPr/>
-          <a:lstStyle/>
-          <a:p>
-            <a:r>
-              <a:rPr lang="en-AU" dirty="0" err="1" smtClean="0"/>
-              <a:t>todo</a:t>
-            </a:r>
-            <a:endParaRPr lang="en-AU" dirty="0"/>
-          </a:p>
-        </p:txBody>
-      </p:sp>
-    </p:spTree>
-    <p:extLst>
-      <p:ext uri="{BB962C8B-B14F-4D97-AF65-F5344CB8AC3E}">
-        <p14:creationId xmlns:p14="http://schemas.microsoft.com/office/powerpoint/2010/main" val="437241435"/>
-      </p:ext>
-    </p:extLst>
-  </p:cSld>
-  <p:clrMapOvr>
-    <a:masterClrMapping/>
-  </p:clrMapOvr>
-  <p:transition>
-    <p:fade/>
-  </p:transition>
-</p:sld>
-</file>
-
-<file path=ppt/slides/slide27.xml><?xml version="1.0" encoding="utf-8"?>
-<p:sld xmlns:a="http://schemas.openxmlformats.org/drawingml/2006/main" xmlns:r="http://schemas.openxmlformats.org/officeDocument/2006/relationships" xmlns:p="http://schemas.openxmlformats.org/presentationml/2006/main">
-  <p:cSld>
-    <p:spTree>
-      <p:nvGrpSpPr>
-        <p:cNvPr id="1" name=""/>
-        <p:cNvGrpSpPr/>
-        <p:nvPr/>
-      </p:nvGrpSpPr>
-      <p:grpSpPr>
-        <a:xfrm>
-          <a:off x="0" y="0"/>
-          <a:ext cx="0" cy="0"/>
-          <a:chOff x="0" y="0"/>
-          <a:chExt cx="0" cy="0"/>
-        </a:xfrm>
-      </p:grpSpPr>
-      <p:sp>
-        <p:nvSpPr>
-          <p:cNvPr id="2" name="Title 1"/>
-          <p:cNvSpPr>
-            <a:spLocks noGrp="1"/>
-          </p:cNvSpPr>
-          <p:nvPr>
-            <p:ph type="title"/>
-          </p:nvPr>
-        </p:nvSpPr>
-        <p:spPr/>
-        <p:txBody>
-          <a:bodyPr/>
-          <a:lstStyle/>
-          <a:p>
-            <a:r>
-              <a:rPr lang="en-AU" dirty="0" smtClean="0"/>
-              <a:t>Transient Fault Handling library</a:t>
-            </a:r>
-            <a:endParaRPr lang="en-AU" dirty="0"/>
-          </a:p>
-        </p:txBody>
-      </p:sp>
-      <p:sp>
-        <p:nvSpPr>
-          <p:cNvPr id="3" name="Text Placeholder 2"/>
-          <p:cNvSpPr>
-            <a:spLocks noGrp="1"/>
-          </p:cNvSpPr>
-          <p:nvPr>
-            <p:ph type="body" sz="quarter" idx="10"/>
-          </p:nvPr>
-        </p:nvSpPr>
-        <p:spPr>
-          <a:xfrm>
-            <a:off x="519112" y="1447799"/>
-            <a:ext cx="11149013" cy="553998"/>
-          </a:xfrm>
-        </p:spPr>
-        <p:txBody>
-          <a:bodyPr/>
-          <a:lstStyle/>
-          <a:p>
-            <a:r>
-              <a:rPr lang="en-AU" dirty="0" err="1" smtClean="0"/>
-              <a:t>todo</a:t>
-            </a:r>
-            <a:endParaRPr lang="en-AU" dirty="0"/>
-          </a:p>
-        </p:txBody>
-      </p:sp>
-    </p:spTree>
-    <p:extLst>
-      <p:ext uri="{BB962C8B-B14F-4D97-AF65-F5344CB8AC3E}">
-        <p14:creationId xmlns:p14="http://schemas.microsoft.com/office/powerpoint/2010/main" val="1818265585"/>
-      </p:ext>
-    </p:extLst>
-  </p:cSld>
-  <p:clrMapOvr>
-    <a:masterClrMapping/>
-  </p:clrMapOvr>
-  <p:transition>
-    <p:fade/>
-  </p:transition>
-</p:sld>
-</file>
-
-<file path=ppt/slides/slide28.xml><?xml version="1.0" encoding="utf-8"?>
-<p:sld xmlns:a="http://schemas.openxmlformats.org/drawingml/2006/main" xmlns:r="http://schemas.openxmlformats.org/officeDocument/2006/relationships" xmlns:p="http://schemas.openxmlformats.org/presentationml/2006/main">
-  <p:cSld>
-    <p:spTree>
-      <p:nvGrpSpPr>
-        <p:cNvPr id="1" name=""/>
-        <p:cNvGrpSpPr/>
-        <p:nvPr/>
-      </p:nvGrpSpPr>
-      <p:grpSpPr>
-        <a:xfrm>
-          <a:off x="0" y="0"/>
-          <a:ext cx="0" cy="0"/>
-          <a:chOff x="0" y="0"/>
-          <a:chExt cx="0" cy="0"/>
-        </a:xfrm>
-      </p:grpSpPr>
-      <p:sp>
-        <p:nvSpPr>
-          <p:cNvPr id="2" name="Title 1"/>
-          <p:cNvSpPr>
-            <a:spLocks noGrp="1"/>
-          </p:cNvSpPr>
-          <p:nvPr>
-            <p:ph type="title"/>
-          </p:nvPr>
-        </p:nvSpPr>
-        <p:spPr/>
-        <p:txBody>
-          <a:bodyPr/>
-          <a:lstStyle/>
-          <a:p>
-            <a:r>
-              <a:rPr lang="en-AU" dirty="0" err="1" smtClean="0"/>
-              <a:t>NHibernate.SqlAzure</a:t>
-            </a:r>
-            <a:r>
-              <a:rPr lang="en-AU" dirty="0" smtClean="0"/>
-              <a:t> library</a:t>
-            </a:r>
-            <a:endParaRPr lang="en-AU" dirty="0"/>
-          </a:p>
-        </p:txBody>
-      </p:sp>
-      <p:sp>
-        <p:nvSpPr>
-          <p:cNvPr id="3" name="Text Placeholder 2"/>
-          <p:cNvSpPr>
-            <a:spLocks noGrp="1"/>
-          </p:cNvSpPr>
-          <p:nvPr>
-            <p:ph type="body" sz="quarter" idx="10"/>
-          </p:nvPr>
-        </p:nvSpPr>
-        <p:spPr>
-          <a:xfrm>
-            <a:off x="519112" y="1447799"/>
-            <a:ext cx="11149013" cy="553998"/>
-          </a:xfrm>
-        </p:spPr>
-        <p:txBody>
-          <a:bodyPr/>
-          <a:lstStyle/>
-          <a:p>
-            <a:r>
-              <a:rPr lang="en-AU" dirty="0" err="1" smtClean="0"/>
-              <a:t>todo</a:t>
-            </a:r>
-            <a:endParaRPr lang="en-AU" dirty="0"/>
-          </a:p>
-        </p:txBody>
-      </p:sp>
-    </p:spTree>
-    <p:extLst>
-      <p:ext uri="{BB962C8B-B14F-4D97-AF65-F5344CB8AC3E}">
-        <p14:creationId xmlns:p14="http://schemas.microsoft.com/office/powerpoint/2010/main" val="2969714386"/>
-      </p:ext>
-    </p:extLst>
-  </p:cSld>
-  <p:clrMapOvr>
-    <a:masterClrMapping/>
-  </p:clrMapOvr>
-  <p:transition>
-    <p:fade/>
-  </p:transition>
-</p:sld>
-</file>
-
-<file path=ppt/slides/slide29.xml><?xml version="1.0" encoding="utf-8"?>
-<p:sld xmlns:a="http://schemas.openxmlformats.org/drawingml/2006/main" xmlns:r="http://schemas.openxmlformats.org/officeDocument/2006/relationships" xmlns:p="http://schemas.openxmlformats.org/presentationml/2006/main">
-  <p:cSld>
-    <p:spTree>
-      <p:nvGrpSpPr>
-        <p:cNvPr id="1" name=""/>
-        <p:cNvGrpSpPr/>
-        <p:nvPr/>
-      </p:nvGrpSpPr>
-      <p:grpSpPr>
-        <a:xfrm>
-          <a:off x="0" y="0"/>
-          <a:ext cx="0" cy="0"/>
-          <a:chOff x="0" y="0"/>
-          <a:chExt cx="0" cy="0"/>
-        </a:xfrm>
-      </p:grpSpPr>
-      <p:sp>
-        <p:nvSpPr>
-          <p:cNvPr id="3" name="Text Placeholder 2"/>
-          <p:cNvSpPr>
-            <a:spLocks noGrp="1"/>
-          </p:cNvSpPr>
-          <p:nvPr>
-            <p:ph type="body" sz="quarter" idx="10"/>
-          </p:nvPr>
-        </p:nvSpPr>
-        <p:spPr>
-          <a:xfrm>
-            <a:off x="521208" y="2397746"/>
-            <a:ext cx="10693401" cy="1378644"/>
-          </a:xfrm>
-        </p:spPr>
-        <p:txBody>
-          <a:bodyPr/>
-          <a:lstStyle/>
-          <a:p>
-            <a:r>
-              <a:rPr lang="en-US" dirty="0" smtClean="0"/>
-              <a:t>When should I use it?</a:t>
-            </a:r>
-            <a:endParaRPr lang="en-US" dirty="0"/>
-          </a:p>
-        </p:txBody>
-      </p:sp>
-    </p:spTree>
-    <p:extLst>
-      <p:ext uri="{BB962C8B-B14F-4D97-AF65-F5344CB8AC3E}">
-        <p14:creationId xmlns:p14="http://schemas.microsoft.com/office/powerpoint/2010/main" val="2989498135"/>
-      </p:ext>
-    </p:extLst>
-  </p:cSld>
-  <p:clrMapOvr>
-    <a:masterClrMapping/>
-  </p:clrMapOvr>
-  <p:transition>
-    <p:fade/>
-  </p:transition>
-  <p:timing>
-    <p:tnLst>
-      <p:par>
-        <p:cTn id="1" dur="indefinite" restart="never" nodeType="tmRoot"/>
-      </p:par>
-    </p:tnLst>
-  </p:timing>
-</p:sld>
-</file>
-
-<file path=ppt/slides/slide3.xml><?xml version="1.0" encoding="utf-8"?>
-<p:sld xmlns:a="http://schemas.openxmlformats.org/drawingml/2006/main" xmlns:r="http://schemas.openxmlformats.org/officeDocument/2006/relationships" xmlns:p="http://schemas.openxmlformats.org/presentationml/2006/main">
-  <p:cSld>
-    <p:spTree>
-      <p:nvGrpSpPr>
-        <p:cNvPr id="1" name=""/>
-        <p:cNvGrpSpPr/>
-        <p:nvPr/>
-      </p:nvGrpSpPr>
-      <p:grpSpPr>
-        <a:xfrm>
-          <a:off x="0" y="0"/>
-          <a:ext cx="0" cy="0"/>
-          <a:chOff x="0" y="0"/>
-          <a:chExt cx="0" cy="0"/>
-        </a:xfrm>
-      </p:grpSpPr>
-      <p:sp>
-        <p:nvSpPr>
-          <p:cNvPr id="2" name="Text Placeholder 1"/>
-          <p:cNvSpPr>
-            <a:spLocks noGrp="1"/>
-          </p:cNvSpPr>
-          <p:nvPr>
-            <p:ph type="body" sz="quarter" idx="10"/>
-          </p:nvPr>
-        </p:nvSpPr>
-        <p:spPr>
-          <a:xfrm>
-            <a:off x="521208" y="2396469"/>
-            <a:ext cx="10693401" cy="1378644"/>
-          </a:xfrm>
-        </p:spPr>
-        <p:txBody>
-          <a:bodyPr/>
-          <a:lstStyle/>
-          <a:p>
-            <a:r>
-              <a:rPr lang="en-US" dirty="0" smtClean="0"/>
-              <a:t>What is it?</a:t>
-            </a:r>
-            <a:endParaRPr lang="en-US" dirty="0"/>
-          </a:p>
-        </p:txBody>
-      </p:sp>
-    </p:spTree>
-    <p:extLst>
-      <p:ext uri="{BB962C8B-B14F-4D97-AF65-F5344CB8AC3E}">
-        <p14:creationId xmlns:p14="http://schemas.microsoft.com/office/powerpoint/2010/main" val="1150072444"/>
-      </p:ext>
-    </p:extLst>
-  </p:cSld>
-  <p:clrMapOvr>
-    <a:masterClrMapping/>
-  </p:clrMapOvr>
-  <p:transition>
-    <p:fade/>
-  </p:transition>
-  <p:timing>
-    <p:tnLst>
-      <p:par>
-        <p:cTn id="1" dur="indefinite" restart="never" nodeType="tmRoot"/>
-      </p:par>
-    </p:tnLst>
-  </p:timing>
-</p:sld>
-</file>
-
-<file path=ppt/slides/slide30.xml><?xml version="1.0" encoding="utf-8"?>
-<p:sld xmlns:a="http://schemas.openxmlformats.org/drawingml/2006/main" xmlns:r="http://schemas.openxmlformats.org/officeDocument/2006/relationships" xmlns:p="http://schemas.openxmlformats.org/presentationml/2006/main">
-  <p:cSld>
-    <p:spTree>
-      <p:nvGrpSpPr>
-        <p:cNvPr id="1" name=""/>
-        <p:cNvGrpSpPr/>
-        <p:nvPr/>
-      </p:nvGrpSpPr>
-      <p:grpSpPr>
-        <a:xfrm>
-          <a:off x="0" y="0"/>
-          <a:ext cx="0" cy="0"/>
-          <a:chOff x="0" y="0"/>
-          <a:chExt cx="0" cy="0"/>
-        </a:xfrm>
-      </p:grpSpPr>
-      <p:sp>
-        <p:nvSpPr>
-          <p:cNvPr id="2" name="Title 1"/>
-          <p:cNvSpPr>
-            <a:spLocks noGrp="1"/>
-          </p:cNvSpPr>
-          <p:nvPr>
-            <p:ph type="title"/>
-          </p:nvPr>
-        </p:nvSpPr>
-        <p:spPr/>
-        <p:txBody>
-          <a:bodyPr/>
-          <a:lstStyle/>
-          <a:p>
-            <a:r>
-              <a:rPr lang="en-AU" dirty="0" smtClean="0"/>
               <a:t>When should I use it?</a:t>
             </a:r>
             <a:endParaRPr lang="en-AU" dirty="0"/>
@@ -25494,7 +25671,7 @@
 </p:sld>
 </file>
 
-<file path=ppt/slides/slide31.xml><?xml version="1.0" encoding="utf-8"?>
+<file path=ppt/slides/slide32.xml><?xml version="1.0" encoding="utf-8"?>
 <p:sld xmlns:a="http://schemas.openxmlformats.org/drawingml/2006/main" xmlns:r="http://schemas.openxmlformats.org/officeDocument/2006/relationships" xmlns:p="http://schemas.openxmlformats.org/presentationml/2006/main">
   <p:cSld>
     <p:bg>
@@ -25632,7 +25809,7 @@
 </p:sld>
 </file>
 
-<file path=ppt/slides/slide32.xml><?xml version="1.0" encoding="utf-8"?>
+<file path=ppt/slides/slide33.xml><?xml version="1.0" encoding="utf-8"?>
 <p:sld xmlns:a="http://schemas.openxmlformats.org/drawingml/2006/main" xmlns:r="http://schemas.openxmlformats.org/officeDocument/2006/relationships" xmlns:p="http://schemas.openxmlformats.org/presentationml/2006/main">
   <p:cSld>
     <p:spTree>
@@ -25733,84 +25910,6 @@
     <p:extLst>
       <p:ext uri="{BB962C8B-B14F-4D97-AF65-F5344CB8AC3E}">
         <p14:creationId xmlns:p14="http://schemas.microsoft.com/office/powerpoint/2010/main" val="767953662"/>
-      </p:ext>
-    </p:extLst>
-  </p:cSld>
-  <p:clrMapOvr>
-    <a:masterClrMapping/>
-  </p:clrMapOvr>
-  <p:transition>
-    <p:fade/>
-  </p:transition>
-  <p:timing>
-    <p:tnLst>
-      <p:par>
-        <p:cTn id="1" dur="indefinite" restart="never" nodeType="tmRoot"/>
-      </p:par>
-    </p:tnLst>
-  </p:timing>
-</p:sld>
-</file>
-
-<file path=ppt/slides/slide33.xml><?xml version="1.0" encoding="utf-8"?>
-<p:sld xmlns:a="http://schemas.openxmlformats.org/drawingml/2006/main" xmlns:r="http://schemas.openxmlformats.org/officeDocument/2006/relationships" xmlns:p="http://schemas.openxmlformats.org/presentationml/2006/main">
-  <p:cSld>
-    <p:spTree>
-      <p:nvGrpSpPr>
-        <p:cNvPr id="1" name=""/>
-        <p:cNvGrpSpPr/>
-        <p:nvPr/>
-      </p:nvGrpSpPr>
-      <p:grpSpPr>
-        <a:xfrm>
-          <a:off x="0" y="0"/>
-          <a:ext cx="0" cy="0"/>
-          <a:chOff x="0" y="0"/>
-          <a:chExt cx="0" cy="0"/>
-        </a:xfrm>
-      </p:grpSpPr>
-      <p:sp>
-        <p:nvSpPr>
-          <p:cNvPr id="2" name="Text Placeholder 1"/>
-          <p:cNvSpPr>
-            <a:spLocks noGrp="1"/>
-          </p:cNvSpPr>
-          <p:nvPr>
-            <p:ph type="body" sz="quarter" idx="10"/>
-          </p:nvPr>
-        </p:nvSpPr>
-        <p:spPr>
-          <a:xfrm>
-            <a:off x="521208" y="3139430"/>
-            <a:ext cx="10693401" cy="1378644"/>
-          </a:xfrm>
-        </p:spPr>
-        <p:txBody>
-          <a:bodyPr/>
-          <a:lstStyle/>
-          <a:p>
-            <a:r>
-              <a:rPr lang="en-US" dirty="0"/>
-              <a:t>Thank </a:t>
-            </a:r>
-            <a:r>
-              <a:rPr lang="en-US" dirty="0" smtClean="0"/>
-              <a:t>You…</a:t>
-            </a:r>
-          </a:p>
-          <a:p>
-            <a:r>
-              <a:rPr lang="en-US" dirty="0" smtClean="0"/>
-              <a:t>		Questions?</a:t>
-            </a:r>
-            <a:endParaRPr lang="en-US" dirty="0"/>
-          </a:p>
-        </p:txBody>
-      </p:sp>
-    </p:spTree>
-    <p:extLst>
-      <p:ext uri="{BB962C8B-B14F-4D97-AF65-F5344CB8AC3E}">
-        <p14:creationId xmlns:p14="http://schemas.microsoft.com/office/powerpoint/2010/main" val="3364595793"/>
       </p:ext>
     </p:extLst>
   </p:cSld>
@@ -25849,6 +25948,84 @@
       </p:grpSpPr>
       <p:sp>
         <p:nvSpPr>
+          <p:cNvPr id="2" name="Text Placeholder 1"/>
+          <p:cNvSpPr>
+            <a:spLocks noGrp="1"/>
+          </p:cNvSpPr>
+          <p:nvPr>
+            <p:ph type="body" sz="quarter" idx="10"/>
+          </p:nvPr>
+        </p:nvSpPr>
+        <p:spPr>
+          <a:xfrm>
+            <a:off x="521208" y="3139430"/>
+            <a:ext cx="10693401" cy="1378644"/>
+          </a:xfrm>
+        </p:spPr>
+        <p:txBody>
+          <a:bodyPr/>
+          <a:lstStyle/>
+          <a:p>
+            <a:r>
+              <a:rPr lang="en-US" dirty="0"/>
+              <a:t>Thank </a:t>
+            </a:r>
+            <a:r>
+              <a:rPr lang="en-US" dirty="0" smtClean="0"/>
+              <a:t>You…</a:t>
+            </a:r>
+          </a:p>
+          <a:p>
+            <a:r>
+              <a:rPr lang="en-US" dirty="0" smtClean="0"/>
+              <a:t>		Questions?</a:t>
+            </a:r>
+            <a:endParaRPr lang="en-US" dirty="0"/>
+          </a:p>
+        </p:txBody>
+      </p:sp>
+    </p:spTree>
+    <p:extLst>
+      <p:ext uri="{BB962C8B-B14F-4D97-AF65-F5344CB8AC3E}">
+        <p14:creationId xmlns:p14="http://schemas.microsoft.com/office/powerpoint/2010/main" val="3364595793"/>
+      </p:ext>
+    </p:extLst>
+  </p:cSld>
+  <p:clrMapOvr>
+    <a:masterClrMapping/>
+  </p:clrMapOvr>
+  <p:transition>
+    <p:fade/>
+  </p:transition>
+  <p:timing>
+    <p:tnLst>
+      <p:par>
+        <p:cTn id="1" dur="indefinite" restart="never" nodeType="tmRoot"/>
+      </p:par>
+    </p:tnLst>
+  </p:timing>
+</p:sld>
+</file>
+
+<file path=ppt/slides/slide35.xml><?xml version="1.0" encoding="utf-8"?>
+<p:sld xmlns:a="http://schemas.openxmlformats.org/drawingml/2006/main" xmlns:r="http://schemas.openxmlformats.org/officeDocument/2006/relationships" xmlns:p="http://schemas.openxmlformats.org/presentationml/2006/main">
+  <p:cSld>
+    <p:spTree>
+      <p:nvGrpSpPr>
+        <p:cNvPr id="1" name=""/>
+        <p:cNvGrpSpPr/>
+        <p:nvPr/>
+      </p:nvGrpSpPr>
+      <p:grpSpPr>
+        <a:xfrm>
+          <a:off x="0" y="0"/>
+          <a:ext cx="0" cy="0"/>
+          <a:chOff x="0" y="0"/>
+          <a:chExt cx="0" cy="0"/>
+        </a:xfrm>
+      </p:grpSpPr>
+      <p:sp>
+        <p:nvSpPr>
           <p:cNvPr id="2" name="Title 1"/>
           <p:cNvSpPr>
             <a:spLocks noGrp="1"/>
@@ -25883,7 +26060,7 @@
         <p:spPr>
           <a:xfrm>
             <a:off x="519112" y="1447799"/>
-            <a:ext cx="11149013" cy="2885405"/>
+            <a:ext cx="11149013" cy="4108817"/>
           </a:xfrm>
         </p:spPr>
         <p:txBody>
@@ -25914,10 +26091,29 @@
               <a:buChar char="•"/>
             </a:pPr>
             <a:r>
-              <a:rPr lang="en-AU">
+              <a:rPr lang="en-AU" dirty="0">
                 <a:hlinkClick r:id="rId3"/>
               </a:rPr>
-              <a:t>http://social.technet.microsoft.com/wiki/contents/articles/3507.windows-azure-sql-database-performance-and-elasticity-guide.aspx</a:t>
+              <a:t>http://</a:t>
+            </a:r>
+            <a:r>
+              <a:rPr lang="en-AU" dirty="0" smtClean="0">
+                <a:hlinkClick r:id="rId3"/>
+              </a:rPr>
+              <a:t>social.technet.microsoft.com/wiki/contents/articles/3507.windows-azure-sql-database-performance-and-elasticity-guide.aspx</a:t>
+            </a:r>
+            <a:endParaRPr lang="en-AU" dirty="0" smtClean="0"/>
+          </a:p>
+          <a:p>
+            <a:pPr marL="574675" indent="-571500">
+              <a:buFont typeface="Arial" panose="020B0604020202020204" pitchFamily="34" charset="0"/>
+              <a:buChar char="•"/>
+            </a:pPr>
+            <a:r>
+              <a:rPr lang="en-AU" dirty="0">
+                <a:hlinkClick r:id="rId4"/>
+              </a:rPr>
+              <a:t>http://msdn.microsoft.com/en-us/library/windowsazure/ee730906.aspx</a:t>
             </a:r>
             <a:endParaRPr lang="en-AU" dirty="0"/>
           </a:p>
@@ -25940,6 +26136,74 @@
 </file>
 
 <file path=ppt/slides/slide4.xml><?xml version="1.0" encoding="utf-8"?>
+<p:sld xmlns:a="http://schemas.openxmlformats.org/drawingml/2006/main" xmlns:r="http://schemas.openxmlformats.org/officeDocument/2006/relationships" xmlns:p="http://schemas.openxmlformats.org/presentationml/2006/main">
+  <p:cSld>
+    <p:spTree>
+      <p:nvGrpSpPr>
+        <p:cNvPr id="1" name=""/>
+        <p:cNvGrpSpPr/>
+        <p:nvPr/>
+      </p:nvGrpSpPr>
+      <p:grpSpPr>
+        <a:xfrm>
+          <a:off x="0" y="0"/>
+          <a:ext cx="0" cy="0"/>
+          <a:chOff x="0" y="0"/>
+          <a:chExt cx="0" cy="0"/>
+        </a:xfrm>
+      </p:grpSpPr>
+      <p:sp>
+        <p:nvSpPr>
+          <p:cNvPr id="2" name="Text Placeholder 1"/>
+          <p:cNvSpPr>
+            <a:spLocks noGrp="1"/>
+          </p:cNvSpPr>
+          <p:nvPr>
+            <p:ph type="body" sz="quarter" idx="10"/>
+          </p:nvPr>
+        </p:nvSpPr>
+        <p:spPr>
+          <a:xfrm>
+            <a:off x="521208" y="2396469"/>
+            <a:ext cx="10693401" cy="1378644"/>
+          </a:xfrm>
+        </p:spPr>
+        <p:txBody>
+          <a:bodyPr/>
+          <a:lstStyle/>
+          <a:p>
+            <a:r>
+              <a:rPr lang="en-US" dirty="0" smtClean="0"/>
+              <a:t>What is it?</a:t>
+            </a:r>
+            <a:endParaRPr lang="en-US" dirty="0"/>
+          </a:p>
+        </p:txBody>
+      </p:sp>
+    </p:spTree>
+    <p:extLst>
+      <p:ext uri="{BB962C8B-B14F-4D97-AF65-F5344CB8AC3E}">
+        <p14:creationId xmlns:p14="http://schemas.microsoft.com/office/powerpoint/2010/main" val="1150072444"/>
+      </p:ext>
+    </p:extLst>
+  </p:cSld>
+  <p:clrMapOvr>
+    <a:masterClrMapping/>
+  </p:clrMapOvr>
+  <p:transition>
+    <p:fade/>
+  </p:transition>
+  <p:timing>
+    <p:tnLst>
+      <p:par>
+        <p:cTn id="1" dur="indefinite" restart="never" nodeType="tmRoot"/>
+      </p:par>
+    </p:tnLst>
+  </p:timing>
+</p:sld>
+</file>
+
+<file path=ppt/slides/slide5.xml><?xml version="1.0" encoding="utf-8"?>
 <p:sld xmlns:a="http://schemas.openxmlformats.org/drawingml/2006/main" xmlns:r="http://schemas.openxmlformats.org/officeDocument/2006/relationships" xmlns:p="http://schemas.openxmlformats.org/presentationml/2006/main">
   <p:cSld>
     <p:spTree>
@@ -26888,7 +27152,7 @@
 </p:sld>
 </file>
 
-<file path=ppt/slides/slide5.xml><?xml version="1.0" encoding="utf-8"?>
+<file path=ppt/slides/slide6.xml><?xml version="1.0" encoding="utf-8"?>
 <p:sld xmlns:a="http://schemas.openxmlformats.org/drawingml/2006/main" xmlns:r="http://schemas.openxmlformats.org/officeDocument/2006/relationships" xmlns:p="http://schemas.openxmlformats.org/presentationml/2006/main">
   <p:cSld>
     <p:spTree>
@@ -27691,7 +27955,7 @@
 </p:sld>
 </file>
 
-<file path=ppt/slides/slide6.xml><?xml version="1.0" encoding="utf-8"?>
+<file path=ppt/slides/slide7.xml><?xml version="1.0" encoding="utf-8"?>
 <p:sld xmlns:a="http://schemas.openxmlformats.org/drawingml/2006/main" xmlns:r="http://schemas.openxmlformats.org/officeDocument/2006/relationships" xmlns:p="http://schemas.openxmlformats.org/presentationml/2006/main">
   <p:cSld>
     <p:spTree>
@@ -32037,7 +32301,7 @@
 </p:sld>
 </file>
 
-<file path=ppt/slides/slide7.xml><?xml version="1.0" encoding="utf-8"?>
+<file path=ppt/slides/slide8.xml><?xml version="1.0" encoding="utf-8"?>
 <p:sld xmlns:a="http://schemas.openxmlformats.org/drawingml/2006/main" xmlns:r="http://schemas.openxmlformats.org/officeDocument/2006/relationships" xmlns:p="http://schemas.openxmlformats.org/presentationml/2006/main">
   <p:cSld>
     <p:spTree>
@@ -32154,7 +32418,7 @@
 </p:sld>
 </file>
 
-<file path=ppt/slides/slide8.xml><?xml version="1.0" encoding="utf-8"?>
+<file path=ppt/slides/slide9.xml><?xml version="1.0" encoding="utf-8"?>
 <p:sld xmlns:a="http://schemas.openxmlformats.org/drawingml/2006/main" xmlns:r="http://schemas.openxmlformats.org/officeDocument/2006/relationships" xmlns:p="http://schemas.openxmlformats.org/presentationml/2006/main">
   <p:cSld>
     <p:spTree>
@@ -33827,79 +34091,6 @@
     <p:extLst>
       <p:ext uri="{BB962C8B-B14F-4D97-AF65-F5344CB8AC3E}">
         <p14:creationId xmlns:p14="http://schemas.microsoft.com/office/powerpoint/2010/main" val="3694602886"/>
-      </p:ext>
-    </p:extLst>
-  </p:cSld>
-  <p:clrMapOvr>
-    <a:masterClrMapping/>
-  </p:clrMapOvr>
-  <p:transition>
-    <p:fade/>
-  </p:transition>
-  <p:timing>
-    <p:tnLst>
-      <p:par>
-        <p:cTn id="1" dur="indefinite" restart="never" nodeType="tmRoot"/>
-      </p:par>
-    </p:tnLst>
-  </p:timing>
-</p:sld>
-</file>
-
-<file path=ppt/slides/slide9.xml><?xml version="1.0" encoding="utf-8"?>
-<p:sld xmlns:a="http://schemas.openxmlformats.org/drawingml/2006/main" xmlns:r="http://schemas.openxmlformats.org/officeDocument/2006/relationships" xmlns:p="http://schemas.openxmlformats.org/presentationml/2006/main">
-  <p:cSld>
-    <p:spTree>
-      <p:nvGrpSpPr>
-        <p:cNvPr id="1" name=""/>
-        <p:cNvGrpSpPr/>
-        <p:nvPr/>
-      </p:nvGrpSpPr>
-      <p:grpSpPr>
-        <a:xfrm>
-          <a:off x="0" y="0"/>
-          <a:ext cx="0" cy="0"/>
-          <a:chOff x="0" y="0"/>
-          <a:chExt cx="0" cy="0"/>
-        </a:xfrm>
-      </p:grpSpPr>
-      <p:sp>
-        <p:nvSpPr>
-          <p:cNvPr id="3" name="Text Placeholder 2"/>
-          <p:cNvSpPr>
-            <a:spLocks noGrp="1"/>
-          </p:cNvSpPr>
-          <p:nvPr>
-            <p:ph type="body" sz="quarter" idx="10"/>
-          </p:nvPr>
-        </p:nvSpPr>
-        <p:spPr>
-          <a:xfrm>
-            <a:off x="521208" y="2057400"/>
-            <a:ext cx="10693401" cy="1378644"/>
-          </a:xfrm>
-        </p:spPr>
-        <p:txBody>
-          <a:bodyPr/>
-          <a:lstStyle/>
-          <a:p>
-            <a:pPr indent="3175"/>
-            <a:r>
-              <a:rPr lang="en-US" dirty="0"/>
-              <a:t>What are the pros / </a:t>
-            </a:r>
-            <a:r>
-              <a:rPr lang="en-US" dirty="0" smtClean="0"/>
-              <a:t>cons / differences?</a:t>
-            </a:r>
-            <a:endParaRPr lang="en-US" dirty="0"/>
-          </a:p>
-        </p:txBody>
-      </p:sp>
-    </p:spTree>
-    <p:extLst>
-      <p:ext uri="{BB962C8B-B14F-4D97-AF65-F5344CB8AC3E}">
-        <p14:creationId xmlns:p14="http://schemas.microsoft.com/office/powerpoint/2010/main" val="2331921382"/>
       </p:ext>
     </p:extLst>
   </p:cSld>

</xml_diff>

<commit_message>
Added note about timeouts to the transient section
</commit_message>
<xml_diff>
--- a/Presentation.pptx
+++ b/Presentation.pptx
@@ -368,7 +368,7 @@
                 <a:latin typeface="Segoe UI" pitchFamily="34" charset="0"/>
               </a:rPr>
               <a:pPr/>
-              <a:t>5/15/2013</a:t>
+              <a:t>5/16/2013</a:t>
             </a:fld>
             <a:endParaRPr lang="en-US" dirty="0">
               <a:latin typeface="Segoe UI" pitchFamily="34" charset="0"/>
@@ -584,7 +584,7 @@
             <a:fld id="{7C3FBCD4-166E-446F-AF18-7D4A0CF9AEF6}" type="datetimeFigureOut">
               <a:rPr lang="en-US" smtClean="0"/>
               <a:pPr/>
-              <a:t>5/15/2013</a:t>
+              <a:t>5/16/2013</a:t>
             </a:fld>
             <a:endParaRPr lang="en-US" dirty="0"/>
           </a:p>
@@ -8469,7 +8469,7 @@
             <a:fld id="{D7CE58A2-1EDC-45F0-BACE-E3574D82C834}" type="datetimeFigureOut">
               <a:rPr lang="en-US" smtClean="0"/>
               <a:pPr/>
-              <a:t>5/15/2013</a:t>
+              <a:t>5/16/2013</a:t>
             </a:fld>
             <a:endParaRPr lang="en-US"/>
           </a:p>
@@ -22363,7 +22363,6 @@
               <a:rPr lang="en-US" sz="2000" dirty="0" smtClean="0"/>
               <a:t>june.tabadero@readify.net</a:t>
             </a:r>
-            <a:endParaRPr lang="en-US" sz="2000" dirty="0" smtClean="0"/>
           </a:p>
           <a:p>
             <a:pPr algn="ctr"/>
@@ -23792,7 +23791,6 @@
               <a:rPr lang="en-AU" dirty="0" smtClean="0"/>
               <a:t>Multi-tenancy is cost-effective</a:t>
             </a:r>
-            <a:endParaRPr lang="en-AU" dirty="0" smtClean="0"/>
           </a:p>
         </p:txBody>
       </p:sp>
@@ -23884,7 +23882,6 @@
               <a:rPr lang="en-US" sz="4000" dirty="0" smtClean="0"/>
               <a:t>How is it different from SQL Server?</a:t>
             </a:r>
-            <a:endParaRPr lang="en-US" sz="4000" dirty="0" smtClean="0"/>
           </a:p>
           <a:p>
             <a:pPr marL="0" indent="3175"/>
@@ -23892,7 +23889,6 @@
               <a:rPr lang="en-US" sz="4000" dirty="0" smtClean="0"/>
               <a:t>Major pain points</a:t>
             </a:r>
-            <a:endParaRPr lang="en-US" sz="4000" dirty="0" smtClean="0"/>
           </a:p>
           <a:p>
             <a:pPr marL="0" indent="3175"/>
@@ -29889,11 +29885,7 @@
           <a:p>
             <a:r>
               <a:rPr lang="en-AU" dirty="0" err="1" smtClean="0"/>
-              <a:t>Cerebrat</a:t>
-            </a:r>
-            <a:r>
-              <a:rPr lang="en-AU" dirty="0" err="1" smtClean="0"/>
-              <a:t>a</a:t>
+              <a:t>Cerebrata</a:t>
             </a:r>
             <a:r>
               <a:rPr lang="en-AU" dirty="0" smtClean="0"/>
@@ -29946,7 +29938,6 @@
               <a:rPr lang="en-AU" dirty="0" smtClean="0"/>
               <a:t>Sync Framework</a:t>
             </a:r>
-            <a:endParaRPr lang="en-AU" dirty="0" smtClean="0"/>
           </a:p>
         </p:txBody>
       </p:sp>
@@ -30366,11 +30357,6 @@
               </a:rPr>
               <a:t>Timeouts when the resource isn’t able to respond</a:t>
             </a:r>
-            <a:endParaRPr lang="en-AU" dirty="0" smtClean="0">
-              <a:solidFill>
-                <a:srgbClr val="C00000"/>
-              </a:solidFill>
-            </a:endParaRPr>
           </a:p>
         </p:txBody>
       </p:sp>
@@ -30429,11 +30415,7 @@
           <a:p>
             <a:r>
               <a:rPr lang="en-AU" dirty="0" smtClean="0"/>
-              <a:t>Why </a:t>
-            </a:r>
-            <a:r>
-              <a:rPr lang="en-AU" dirty="0" smtClean="0"/>
-              <a:t>do transient faults occur?</a:t>
+              <a:t>Why do transient faults occur?</a:t>
             </a:r>
             <a:endParaRPr lang="en-AU" dirty="0"/>
           </a:p>
@@ -30753,7 +30735,7 @@
         <p:spPr>
           <a:xfrm>
             <a:off x="519112" y="1447799"/>
-            <a:ext cx="11149013" cy="3901068"/>
+            <a:ext cx="11149013" cy="4570482"/>
           </a:xfrm>
         </p:spPr>
         <p:txBody>
@@ -30788,8 +30770,19 @@
           <a:p>
             <a:r>
               <a:rPr lang="en-AU" dirty="0" smtClean="0"/>
-              <a:t>Connection and command retries</a:t>
-            </a:r>
+              <a:t>Connection and command </a:t>
+            </a:r>
+            <a:r>
+              <a:rPr lang="en-AU" dirty="0" smtClean="0"/>
+              <a:t>retries</a:t>
+            </a:r>
+          </a:p>
+          <a:p>
+            <a:r>
+              <a:rPr lang="en-AU" smtClean="0"/>
+              <a:t>Consider timeouts</a:t>
+            </a:r>
+            <a:endParaRPr lang="en-AU" dirty="0" smtClean="0"/>
           </a:p>
           <a:p>
             <a:r>
@@ -31094,11 +31087,7 @@
             </a:r>
             <a:r>
               <a:rPr lang="en-AU" dirty="0" smtClean="0"/>
-              <a:t> we’ve done th</a:t>
-            </a:r>
-            <a:r>
-              <a:rPr lang="en-AU" dirty="0" smtClean="0"/>
-              <a:t>e work for you:</a:t>
+              <a:t> we’ve done the work for you:</a:t>
             </a:r>
           </a:p>
           <a:p>
@@ -31475,13 +31464,8 @@
             </a:pPr>
             <a:r>
               <a:rPr lang="en-AU" dirty="0" smtClean="0"/>
-              <a:t>Basic use cases </a:t>
-            </a:r>
-            <a:r>
-              <a:rPr lang="en-AU" dirty="0" smtClean="0"/>
-              <a:t>(relational DB)</a:t>
-            </a:r>
-            <a:endParaRPr lang="en-AU" dirty="0" smtClean="0"/>
+              <a:t>Basic use cases (relational DB)</a:t>
+            </a:r>
           </a:p>
           <a:p>
             <a:pPr marL="574675" indent="-571500">
@@ -31490,13 +31474,8 @@
             </a:pPr>
             <a:r>
               <a:rPr lang="en-AU" dirty="0" smtClean="0"/>
-              <a:t>You don’t have a high </a:t>
-            </a:r>
-            <a:r>
-              <a:rPr lang="en-AU" dirty="0" smtClean="0"/>
-              <a:t>load</a:t>
-            </a:r>
-            <a:endParaRPr lang="en-AU" dirty="0" smtClean="0"/>
+              <a:t>You don’t have a high load</a:t>
+            </a:r>
           </a:p>
           <a:p>
             <a:pPr marL="574675" indent="-571500">
@@ -31517,7 +31496,6 @@
               <a:rPr lang="en-AU" dirty="0" smtClean="0"/>
               <a:t>Multi-tenanted</a:t>
             </a:r>
-            <a:endParaRPr lang="en-AU" dirty="0" smtClean="0"/>
           </a:p>
           <a:p>
             <a:pPr marL="574675" indent="-571500">
@@ -31544,15 +31522,7 @@
             </a:pPr>
             <a:r>
               <a:rPr lang="en-AU" dirty="0" smtClean="0"/>
-              <a:t>you </a:t>
-            </a:r>
-            <a:r>
-              <a:rPr lang="en-AU" dirty="0" smtClean="0"/>
-              <a:t>can re-architect for </a:t>
-            </a:r>
-            <a:r>
-              <a:rPr lang="en-AU" dirty="0" smtClean="0"/>
-              <a:t>federations</a:t>
+              <a:t>you can re-architect for federations</a:t>
             </a:r>
           </a:p>
           <a:p>
@@ -31562,17 +31532,8 @@
             </a:pPr>
             <a:r>
               <a:rPr lang="en-AU" dirty="0" smtClean="0"/>
-              <a:t>you </a:t>
-            </a:r>
-            <a:r>
-              <a:rPr lang="en-AU" dirty="0" smtClean="0"/>
-              <a:t>can afford the number of databases </a:t>
-            </a:r>
-            <a:r>
-              <a:rPr lang="en-AU" dirty="0" smtClean="0"/>
-              <a:t>required</a:t>
-            </a:r>
-            <a:endParaRPr lang="en-AU" dirty="0" smtClean="0"/>
+              <a:t>you can afford the number of databases required</a:t>
+            </a:r>
           </a:p>
           <a:p>
             <a:pPr marL="574675" indent="-571500">
@@ -31581,13 +31542,8 @@
             </a:pPr>
             <a:r>
               <a:rPr lang="en-AU" dirty="0" smtClean="0"/>
-              <a:t>You don’t have operations staff with SQL </a:t>
-            </a:r>
-            <a:r>
-              <a:rPr lang="en-AU" dirty="0" smtClean="0"/>
-              <a:t>Server exp.</a:t>
-            </a:r>
-            <a:endParaRPr lang="en-AU" dirty="0" smtClean="0"/>
+              <a:t>You don’t have operations staff with SQL Server exp.</a:t>
+            </a:r>
           </a:p>
         </p:txBody>
       </p:sp>
@@ -39064,11 +39020,7 @@
             </a:r>
             <a:r>
               <a:rPr lang="en-US" sz="4800" dirty="0" smtClean="0"/>
-              <a:t>May 2012</a:t>
-            </a:r>
-            <a:r>
-              <a:rPr lang="en-US" sz="4800" dirty="0" smtClean="0"/>
-              <a:t>)</a:t>
+              <a:t>May 2012)</a:t>
             </a:r>
             <a:endParaRPr lang="en-US" dirty="0">
               <a:solidFill>
@@ -39366,11 +39318,7 @@
                       </a:r>
                       <a:r>
                         <a:rPr lang="en-US" sz="1400" baseline="0" dirty="0" smtClean="0"/>
-                        <a:t> </a:t>
-                      </a:r>
-                      <a:r>
-                        <a:rPr lang="en-US" sz="1400" baseline="0" dirty="0" smtClean="0"/>
-                        <a:t>to 1 GB</a:t>
+                        <a:t> to 1 GB</a:t>
                       </a:r>
                       <a:endParaRPr lang="en-US" sz="1400" dirty="0"/>
                     </a:p>
@@ -39500,11 +39448,7 @@
                     <a:p>
                       <a:r>
                         <a:rPr lang="en-US" sz="1400" dirty="0" smtClean="0"/>
-                        <a:t>1GB </a:t>
-                      </a:r>
-                      <a:r>
-                        <a:rPr lang="en-US" sz="1400" dirty="0" smtClean="0"/>
-                        <a:t>to 10 GB</a:t>
+                        <a:t>1GB to 10 GB</a:t>
                       </a:r>
                       <a:endParaRPr lang="en-US" sz="1400" dirty="0"/>
                     </a:p>
@@ -39572,15 +39516,7 @@
                       </a:r>
                       <a:r>
                         <a:rPr lang="en-US" sz="1400" baseline="0" dirty="0" smtClean="0"/>
-                        <a:t> GB, $</a:t>
-                      </a:r>
-                      <a:r>
-                        <a:rPr lang="en-US" sz="1400" baseline="0" dirty="0" smtClean="0"/>
-                        <a:t>3.996 </a:t>
-                      </a:r>
-                      <a:r>
-                        <a:rPr lang="en-US" sz="1400" baseline="0" dirty="0" smtClean="0"/>
-                        <a:t>per additional GB</a:t>
+                        <a:t> GB, $3.996 per additional GB</a:t>
                       </a:r>
                       <a:endParaRPr lang="en-US" sz="1400" dirty="0"/>
                     </a:p>
@@ -39646,11 +39582,7 @@
                     <a:p>
                       <a:r>
                         <a:rPr lang="en-US" sz="1400" dirty="0" smtClean="0"/>
-                        <a:t>10 </a:t>
-                      </a:r>
-                      <a:r>
-                        <a:rPr lang="en-US" sz="1400" dirty="0" smtClean="0"/>
-                        <a:t>GB to 50 GB</a:t>
+                        <a:t>10 GB to 50 GB</a:t>
                       </a:r>
                       <a:endParaRPr lang="en-US" sz="1400" dirty="0"/>
                     </a:p>
@@ -39714,15 +39646,7 @@
                     <a:p>
                       <a:r>
                         <a:rPr lang="en-US" sz="1400" dirty="0" smtClean="0"/>
-                        <a:t>$45.954 for first 10 GB, $</a:t>
-                      </a:r>
-                      <a:r>
-                        <a:rPr lang="en-US" sz="1400" dirty="0" smtClean="0"/>
-                        <a:t>1.996 </a:t>
-                      </a:r>
-                      <a:r>
-                        <a:rPr lang="en-US" sz="1400" dirty="0" smtClean="0"/>
-                        <a:t>for</a:t>
+                        <a:t>$45.954 for first 10 GB, $1.996 for</a:t>
                       </a:r>
                       <a:r>
                         <a:rPr lang="en-US" sz="1400" baseline="0" dirty="0" smtClean="0"/>
@@ -39792,11 +39716,7 @@
                     <a:p>
                       <a:r>
                         <a:rPr lang="en-US" sz="1400" dirty="0" smtClean="0"/>
-                        <a:t>50 </a:t>
-                      </a:r>
-                      <a:r>
-                        <a:rPr lang="en-US" sz="1400" dirty="0" smtClean="0"/>
-                        <a:t>GB to 150 GB</a:t>
+                        <a:t>50 GB to 150 GB</a:t>
                       </a:r>
                       <a:endParaRPr lang="en-US" sz="1400" dirty="0"/>
                     </a:p>
@@ -39852,15 +39772,7 @@
                     <a:p>
                       <a:r>
                         <a:rPr lang="en-US" sz="1400" dirty="0" smtClean="0"/>
-                        <a:t>$</a:t>
-                      </a:r>
-                      <a:r>
-                        <a:rPr lang="en-US" sz="1400" dirty="0" smtClean="0"/>
-                        <a:t>125.874 </a:t>
-                      </a:r>
-                      <a:r>
-                        <a:rPr lang="en-US" sz="1400" dirty="0" smtClean="0"/>
-                        <a:t>for first 50 GB, $0.999 for each additional GB</a:t>
+                        <a:t>$125.874 for first 50 GB, $0.999 for each additional GB</a:t>
                       </a:r>
                       <a:endParaRPr lang="en-US" sz="1400" dirty="0"/>
                     </a:p>
@@ -40142,11 +40054,7 @@
             </a:pPr>
             <a:r>
               <a:rPr lang="en-US" sz="1600" spc="-51" dirty="0" smtClean="0"/>
-              <a:t>Charged </a:t>
-            </a:r>
-            <a:r>
-              <a:rPr lang="en-US" sz="1600" spc="-51" dirty="0" smtClean="0"/>
-              <a:t>at monthly rate per database</a:t>
+              <a:t>Charged at monthly rate per database</a:t>
             </a:r>
           </a:p>
           <a:p>
@@ -40567,7 +40475,6 @@
               <a:rPr lang="en-US" spc="-51" dirty="0" smtClean="0"/>
               <a:t>is required</a:t>
             </a:r>
-            <a:endParaRPr lang="en-US" spc="-51" dirty="0" smtClean="0"/>
           </a:p>
           <a:p>
             <a:pPr marL="234950" lvl="1" indent="-231775" defTabSz="914325">
@@ -40599,23 +40506,7 @@
             </a:pPr>
             <a:r>
               <a:rPr lang="en-US" spc="-51" dirty="0" smtClean="0"/>
-              <a:t>Add any non-Azure client IP </a:t>
-            </a:r>
-            <a:r>
-              <a:rPr lang="en-US" spc="-51" dirty="0" smtClean="0"/>
-              <a:t>address </a:t>
-            </a:r>
-            <a:r>
-              <a:rPr lang="en-US" spc="-51" dirty="0" smtClean="0"/>
-              <a:t>to </a:t>
-            </a:r>
-            <a:r>
-              <a:rPr lang="en-US" spc="-51" dirty="0" smtClean="0"/>
-              <a:t>the </a:t>
-            </a:r>
-            <a:r>
-              <a:rPr lang="en-US" spc="-51" dirty="0" smtClean="0"/>
-              <a:t>firewall</a:t>
+              <a:t>Add any non-Azure client IP address to the firewall</a:t>
             </a:r>
             <a:endParaRPr lang="en-US" spc="-51" dirty="0"/>
           </a:p>
@@ -41347,7 +41238,6 @@
               <a:rPr lang="en-AU" dirty="0" smtClean="0"/>
               <a:t>Per-”server” firewall</a:t>
             </a:r>
-            <a:endParaRPr lang="en-AU" dirty="0" smtClean="0"/>
           </a:p>
           <a:p>
             <a:r>
@@ -41358,24 +41248,14 @@
           <a:p>
             <a:r>
               <a:rPr lang="en-AU" dirty="0" smtClean="0"/>
-              <a:t>Server </a:t>
-            </a:r>
-            <a:r>
-              <a:rPr lang="en-AU" dirty="0" smtClean="0"/>
-              <a:t>admin </a:t>
-            </a:r>
-            <a:r>
-              <a:rPr lang="en-AU" dirty="0" smtClean="0"/>
-              <a:t>account: special privileges</a:t>
-            </a:r>
-            <a:endParaRPr lang="en-AU" dirty="0" smtClean="0"/>
+              <a:t>Server admin account: special privileges</a:t>
+            </a:r>
           </a:p>
           <a:p>
             <a:r>
               <a:rPr lang="en-AU" dirty="0" smtClean="0"/>
               <a:t>TDS connection is encrypted</a:t>
             </a:r>
-            <a:endParaRPr lang="en-AU" dirty="0" smtClean="0"/>
           </a:p>
           <a:p>
             <a:r>

</xml_diff>